<commit_message>
test: sine-wave generator --> for esp32
</commit_message>
<xml_diff>
--- a/doc/System Architecture.pptx
+++ b/doc/System Architecture.pptx
@@ -262,7 +262,7 @@
           <a:p>
             <a:fld id="{2C69A316-7332-4585-BE20-51321A17224C}" type="datetimeFigureOut">
               <a:rPr lang="ko-KR" altLang="en-US" smtClean="0"/>
-              <a:t>2018-11-23</a:t>
+              <a:t>2019-01-18</a:t>
             </a:fld>
             <a:endParaRPr lang="ko-KR" altLang="en-US"/>
           </a:p>
@@ -460,7 +460,7 @@
           <a:p>
             <a:fld id="{2C69A316-7332-4585-BE20-51321A17224C}" type="datetimeFigureOut">
               <a:rPr lang="ko-KR" altLang="en-US" smtClean="0"/>
-              <a:t>2018-11-23</a:t>
+              <a:t>2019-01-18</a:t>
             </a:fld>
             <a:endParaRPr lang="ko-KR" altLang="en-US"/>
           </a:p>
@@ -668,7 +668,7 @@
           <a:p>
             <a:fld id="{2C69A316-7332-4585-BE20-51321A17224C}" type="datetimeFigureOut">
               <a:rPr lang="ko-KR" altLang="en-US" smtClean="0"/>
-              <a:t>2018-11-23</a:t>
+              <a:t>2019-01-18</a:t>
             </a:fld>
             <a:endParaRPr lang="ko-KR" altLang="en-US"/>
           </a:p>
@@ -866,7 +866,7 @@
           <a:p>
             <a:fld id="{2C69A316-7332-4585-BE20-51321A17224C}" type="datetimeFigureOut">
               <a:rPr lang="ko-KR" altLang="en-US" smtClean="0"/>
-              <a:t>2018-11-23</a:t>
+              <a:t>2019-01-18</a:t>
             </a:fld>
             <a:endParaRPr lang="ko-KR" altLang="en-US"/>
           </a:p>
@@ -1141,7 +1141,7 @@
           <a:p>
             <a:fld id="{2C69A316-7332-4585-BE20-51321A17224C}" type="datetimeFigureOut">
               <a:rPr lang="ko-KR" altLang="en-US" smtClean="0"/>
-              <a:t>2018-11-23</a:t>
+              <a:t>2019-01-18</a:t>
             </a:fld>
             <a:endParaRPr lang="ko-KR" altLang="en-US"/>
           </a:p>
@@ -1406,7 +1406,7 @@
           <a:p>
             <a:fld id="{2C69A316-7332-4585-BE20-51321A17224C}" type="datetimeFigureOut">
               <a:rPr lang="ko-KR" altLang="en-US" smtClean="0"/>
-              <a:t>2018-11-23</a:t>
+              <a:t>2019-01-18</a:t>
             </a:fld>
             <a:endParaRPr lang="ko-KR" altLang="en-US"/>
           </a:p>
@@ -1818,7 +1818,7 @@
           <a:p>
             <a:fld id="{2C69A316-7332-4585-BE20-51321A17224C}" type="datetimeFigureOut">
               <a:rPr lang="ko-KR" altLang="en-US" smtClean="0"/>
-              <a:t>2018-11-23</a:t>
+              <a:t>2019-01-18</a:t>
             </a:fld>
             <a:endParaRPr lang="ko-KR" altLang="en-US"/>
           </a:p>
@@ -1959,7 +1959,7 @@
           <a:p>
             <a:fld id="{2C69A316-7332-4585-BE20-51321A17224C}" type="datetimeFigureOut">
               <a:rPr lang="ko-KR" altLang="en-US" smtClean="0"/>
-              <a:t>2018-11-23</a:t>
+              <a:t>2019-01-18</a:t>
             </a:fld>
             <a:endParaRPr lang="ko-KR" altLang="en-US"/>
           </a:p>
@@ -2072,7 +2072,7 @@
           <a:p>
             <a:fld id="{2C69A316-7332-4585-BE20-51321A17224C}" type="datetimeFigureOut">
               <a:rPr lang="ko-KR" altLang="en-US" smtClean="0"/>
-              <a:t>2018-11-23</a:t>
+              <a:t>2019-01-18</a:t>
             </a:fld>
             <a:endParaRPr lang="ko-KR" altLang="en-US"/>
           </a:p>
@@ -2383,7 +2383,7 @@
           <a:p>
             <a:fld id="{2C69A316-7332-4585-BE20-51321A17224C}" type="datetimeFigureOut">
               <a:rPr lang="ko-KR" altLang="en-US" smtClean="0"/>
-              <a:t>2018-11-23</a:t>
+              <a:t>2019-01-18</a:t>
             </a:fld>
             <a:endParaRPr lang="ko-KR" altLang="en-US"/>
           </a:p>
@@ -2671,7 +2671,7 @@
           <a:p>
             <a:fld id="{2C69A316-7332-4585-BE20-51321A17224C}" type="datetimeFigureOut">
               <a:rPr lang="ko-KR" altLang="en-US" smtClean="0"/>
-              <a:t>2018-11-23</a:t>
+              <a:t>2019-01-18</a:t>
             </a:fld>
             <a:endParaRPr lang="ko-KR" altLang="en-US"/>
           </a:p>
@@ -2912,7 +2912,7 @@
           <a:p>
             <a:fld id="{2C69A316-7332-4585-BE20-51321A17224C}" type="datetimeFigureOut">
               <a:rPr lang="ko-KR" altLang="en-US" smtClean="0"/>
-              <a:t>2018-11-23</a:t>
+              <a:t>2019-01-18</a:t>
             </a:fld>
             <a:endParaRPr lang="ko-KR" altLang="en-US"/>
           </a:p>
@@ -5888,6 +5888,56 @@
           </a:fontRef>
         </p:style>
       </p:cxnSp>
+      <p:sp>
+        <p:nvSpPr>
+          <p:cNvPr id="60" name="직사각형 59">
+            <a:extLst>
+              <a:ext uri="{FF2B5EF4-FFF2-40B4-BE49-F238E27FC236}">
+                <a16:creationId xmlns:a16="http://schemas.microsoft.com/office/drawing/2014/main" id="{D6D5F830-EAB8-4A0D-894F-A5AD1A03D0FE}"/>
+              </a:ext>
+            </a:extLst>
+          </p:cNvPr>
+          <p:cNvSpPr/>
+          <p:nvPr/>
+        </p:nvSpPr>
+        <p:spPr>
+          <a:xfrm>
+            <a:off x="1341252" y="5374824"/>
+            <a:ext cx="1089454" cy="548501"/>
+          </a:xfrm>
+          <a:prstGeom prst="rect">
+            <a:avLst/>
+          </a:prstGeom>
+        </p:spPr>
+        <p:style>
+          <a:lnRef idx="2">
+            <a:schemeClr val="accent1">
+              <a:shade val="50000"/>
+            </a:schemeClr>
+          </a:lnRef>
+          <a:fillRef idx="1">
+            <a:schemeClr val="accent1"/>
+          </a:fillRef>
+          <a:effectRef idx="0">
+            <a:schemeClr val="accent1"/>
+          </a:effectRef>
+          <a:fontRef idx="minor">
+            <a:schemeClr val="lt1"/>
+          </a:fontRef>
+        </p:style>
+        <p:txBody>
+          <a:bodyPr rtlCol="0" anchor="ctr"/>
+          <a:lstStyle/>
+          <a:p>
+            <a:pPr algn="ctr"/>
+            <a:r>
+              <a:rPr lang="en-US" altLang="ko-KR" sz="1000" dirty="0"/>
+              <a:t>Headphone</a:t>
+            </a:r>
+            <a:endParaRPr lang="ko-KR" altLang="en-US" sz="1000" dirty="0"/>
+          </a:p>
+        </p:txBody>
+      </p:sp>
     </p:spTree>
     <p:extLst>
       <p:ext uri="{BB962C8B-B14F-4D97-AF65-F5344CB8AC3E}">
@@ -6272,14 +6322,14 @@
           <p:cNvCxnSpPr>
             <a:cxnSpLocks/>
             <a:stCxn id="6" idx="0"/>
-            <a:endCxn id="11" idx="0"/>
+            <a:endCxn id="68" idx="0"/>
           </p:cNvCxnSpPr>
           <p:nvPr/>
         </p:nvCxnSpPr>
         <p:spPr>
           <a:xfrm>
             <a:off x="6986849" y="2966294"/>
-            <a:ext cx="6177" cy="2143101"/>
+            <a:ext cx="0" cy="708607"/>
           </a:xfrm>
           <a:prstGeom prst="line">
             <a:avLst/>
@@ -6623,8 +6673,8 @@
         </p:nvSpPr>
         <p:spPr>
           <a:xfrm>
-            <a:off x="6269632" y="5109395"/>
-            <a:ext cx="1446787" cy="1455993"/>
+            <a:off x="2984614" y="2626653"/>
+            <a:ext cx="1534666" cy="1455993"/>
           </a:xfrm>
           <a:prstGeom prst="roundRect">
             <a:avLst/>
@@ -6753,7 +6803,7 @@
             <a:pPr algn="ctr"/>
             <a:r>
               <a:rPr lang="en-US" altLang="ko-KR" dirty="0"/>
-              <a:t>AMP</a:t>
+              <a:t>CODEC</a:t>
             </a:r>
             <a:endParaRPr lang="ko-KR" altLang="en-US" dirty="0"/>
           </a:p>
@@ -7005,17 +7055,17 @@
           </p:cNvPr>
           <p:cNvCxnSpPr>
             <a:cxnSpLocks/>
-            <a:stCxn id="11" idx="3"/>
+            <a:stCxn id="11" idx="2"/>
             <a:endCxn id="12" idx="1"/>
           </p:cNvCxnSpPr>
           <p:nvPr/>
         </p:nvCxnSpPr>
         <p:spPr>
-          <a:xfrm flipV="1">
-            <a:off x="7716419" y="5445087"/>
-            <a:ext cx="1244086" cy="392305"/>
-          </a:xfrm>
-          <a:prstGeom prst="bentConnector3">
+          <a:xfrm rot="16200000" flipH="1">
+            <a:off x="5675006" y="2159587"/>
+            <a:ext cx="1362441" cy="5208558"/>
+          </a:xfrm>
+          <a:prstGeom prst="bentConnector2">
             <a:avLst/>
           </a:prstGeom>
           <a:ln w="38100">
@@ -7050,17 +7100,17 @@
           </p:cNvPr>
           <p:cNvCxnSpPr>
             <a:cxnSpLocks/>
-            <a:stCxn id="11" idx="3"/>
-            <a:endCxn id="13" idx="1"/>
+            <a:stCxn id="121" idx="1"/>
+            <a:endCxn id="11" idx="2"/>
           </p:cNvCxnSpPr>
           <p:nvPr/>
         </p:nvCxnSpPr>
         <p:spPr>
-          <a:xfrm>
-            <a:off x="7716419" y="5837392"/>
-            <a:ext cx="1244086" cy="392305"/>
-          </a:xfrm>
-          <a:prstGeom prst="bentConnector3">
+          <a:xfrm rot="10800000">
+            <a:off x="3751947" y="4082646"/>
+            <a:ext cx="2517858" cy="2147050"/>
+          </a:xfrm>
+          <a:prstGeom prst="bentConnector2">
             <a:avLst/>
           </a:prstGeom>
           <a:ln w="38100">
@@ -7098,8 +7148,8 @@
         </p:nvSpPr>
         <p:spPr>
           <a:xfrm>
-            <a:off x="3622053" y="2646788"/>
-            <a:ext cx="1046205" cy="1746421"/>
+            <a:off x="1655976" y="4858631"/>
+            <a:ext cx="1046206" cy="1746421"/>
           </a:xfrm>
           <a:prstGeom prst="rect">
             <a:avLst/>
@@ -7145,22 +7195,24 @@
           </p:cNvPr>
           <p:cNvCxnSpPr>
             <a:cxnSpLocks/>
-            <a:stCxn id="28" idx="3"/>
+            <a:stCxn id="11" idx="3"/>
             <a:endCxn id="14" idx="1"/>
           </p:cNvCxnSpPr>
           <p:nvPr/>
         </p:nvCxnSpPr>
         <p:spPr>
           <a:xfrm flipV="1">
-            <a:off x="4668258" y="836524"/>
-            <a:ext cx="1595197" cy="2683475"/>
+            <a:off x="4519280" y="836524"/>
+            <a:ext cx="1744175" cy="2518126"/>
           </a:xfrm>
           <a:prstGeom prst="bentConnector3">
-            <a:avLst/>
+            <a:avLst>
+              <a:gd name="adj1" fmla="val 50000"/>
+            </a:avLst>
           </a:prstGeom>
           <a:ln w="28575">
             <a:solidFill>
-              <a:schemeClr val="tx1"/>
+              <a:schemeClr val="accent4"/>
             </a:solidFill>
           </a:ln>
         </p:spPr>
@@ -7190,22 +7242,24 @@
           </p:cNvPr>
           <p:cNvCxnSpPr>
             <a:cxnSpLocks/>
-            <a:stCxn id="28" idx="3"/>
+            <a:stCxn id="11" idx="3"/>
             <a:endCxn id="4" idx="1"/>
           </p:cNvCxnSpPr>
           <p:nvPr/>
         </p:nvCxnSpPr>
         <p:spPr>
           <a:xfrm flipV="1">
-            <a:off x="4668258" y="1837295"/>
-            <a:ext cx="1595197" cy="1682704"/>
+            <a:off x="4519280" y="1837295"/>
+            <a:ext cx="1744175" cy="1517355"/>
           </a:xfrm>
           <a:prstGeom prst="bentConnector3">
-            <a:avLst/>
+            <a:avLst>
+              <a:gd name="adj1" fmla="val 50000"/>
+            </a:avLst>
           </a:prstGeom>
           <a:ln w="28575">
             <a:solidFill>
-              <a:schemeClr val="tx1"/>
+              <a:schemeClr val="accent4"/>
             </a:solidFill>
           </a:ln>
         </p:spPr>
@@ -7235,22 +7289,24 @@
           </p:cNvPr>
           <p:cNvCxnSpPr>
             <a:cxnSpLocks/>
-            <a:stCxn id="28" idx="3"/>
+            <a:stCxn id="11" idx="3"/>
             <a:endCxn id="5" idx="1"/>
           </p:cNvCxnSpPr>
           <p:nvPr/>
         </p:nvCxnSpPr>
         <p:spPr>
           <a:xfrm flipV="1">
-            <a:off x="4668258" y="2558776"/>
-            <a:ext cx="1601547" cy="961223"/>
+            <a:off x="4519280" y="2558776"/>
+            <a:ext cx="1750525" cy="795874"/>
           </a:xfrm>
           <a:prstGeom prst="bentConnector3">
-            <a:avLst/>
+            <a:avLst>
+              <a:gd name="adj1" fmla="val 50000"/>
+            </a:avLst>
           </a:prstGeom>
           <a:ln w="28575">
             <a:solidFill>
-              <a:schemeClr val="tx1"/>
+              <a:schemeClr val="accent4"/>
             </a:solidFill>
           </a:ln>
         </p:spPr>
@@ -7280,22 +7336,22 @@
           </p:cNvPr>
           <p:cNvCxnSpPr>
             <a:cxnSpLocks/>
-            <a:stCxn id="28" idx="3"/>
+            <a:stCxn id="11" idx="3"/>
             <a:endCxn id="6" idx="1"/>
           </p:cNvCxnSpPr>
           <p:nvPr/>
         </p:nvCxnSpPr>
         <p:spPr>
           <a:xfrm flipV="1">
-            <a:off x="4668258" y="3258738"/>
-            <a:ext cx="1595197" cy="261261"/>
+            <a:off x="4519280" y="3258738"/>
+            <a:ext cx="1744175" cy="95912"/>
           </a:xfrm>
           <a:prstGeom prst="bentConnector3">
             <a:avLst/>
           </a:prstGeom>
           <a:ln w="28575">
             <a:solidFill>
-              <a:schemeClr val="tx1"/>
+              <a:schemeClr val="accent4"/>
             </a:solidFill>
           </a:ln>
         </p:spPr>
@@ -7325,18 +7381,18 @@
           </p:cNvPr>
           <p:cNvCxnSpPr>
             <a:cxnSpLocks/>
-            <a:stCxn id="28" idx="3"/>
-            <a:endCxn id="11" idx="1"/>
           </p:cNvCxnSpPr>
           <p:nvPr/>
         </p:nvCxnSpPr>
         <p:spPr>
-          <a:xfrm>
-            <a:off x="4668258" y="3519999"/>
-            <a:ext cx="1601374" cy="2317393"/>
+          <a:xfrm rot="16200000" flipH="1">
+            <a:off x="2425554" y="832381"/>
+            <a:ext cx="1761969" cy="608384"/>
           </a:xfrm>
           <a:prstGeom prst="bentConnector3">
-            <a:avLst/>
+            <a:avLst>
+              <a:gd name="adj1" fmla="val 50000"/>
+            </a:avLst>
           </a:prstGeom>
           <a:ln w="28575">
             <a:solidFill>
@@ -7492,10 +7548,10 @@
       </p:sp>
       <p:sp>
         <p:nvSpPr>
-          <p:cNvPr id="59" name="직사각형 58">
-            <a:extLst>
-              <a:ext uri="{FF2B5EF4-FFF2-40B4-BE49-F238E27FC236}">
-                <a16:creationId xmlns:a16="http://schemas.microsoft.com/office/drawing/2014/main" id="{00CF1F2D-E049-46C4-9362-76592011E8EF}"/>
+          <p:cNvPr id="68" name="사각형: 둥근 모서리 67">
+            <a:extLst>
+              <a:ext uri="{FF2B5EF4-FFF2-40B4-BE49-F238E27FC236}">
+                <a16:creationId xmlns:a16="http://schemas.microsoft.com/office/drawing/2014/main" id="{5A2E99BA-3D65-488D-B6E0-78D0655750BF}"/>
               </a:ext>
             </a:extLst>
           </p:cNvPr>
@@ -7504,115 +7560,7 @@
         </p:nvSpPr>
         <p:spPr>
           <a:xfrm>
-            <a:off x="3622053" y="544080"/>
-            <a:ext cx="1040028" cy="584887"/>
-          </a:xfrm>
-          <a:prstGeom prst="rect">
-            <a:avLst/>
-          </a:prstGeom>
-        </p:spPr>
-        <p:style>
-          <a:lnRef idx="2">
-            <a:schemeClr val="accent1">
-              <a:shade val="50000"/>
-            </a:schemeClr>
-          </a:lnRef>
-          <a:fillRef idx="1">
-            <a:schemeClr val="accent1"/>
-          </a:fillRef>
-          <a:effectRef idx="0">
-            <a:schemeClr val="accent1"/>
-          </a:effectRef>
-          <a:fontRef idx="minor">
-            <a:schemeClr val="lt1"/>
-          </a:fontRef>
-        </p:style>
-        <p:txBody>
-          <a:bodyPr rtlCol="0" anchor="ctr"/>
-          <a:lstStyle/>
-          <a:p>
-            <a:pPr algn="ctr"/>
-            <a:r>
-              <a:rPr lang="en-US" altLang="ko-KR" dirty="0"/>
-              <a:t>Reset</a:t>
-            </a:r>
-          </a:p>
-          <a:p>
-            <a:pPr algn="ctr"/>
-            <a:r>
-              <a:rPr lang="en-US" altLang="ko-KR" dirty="0"/>
-              <a:t>IC</a:t>
-            </a:r>
-            <a:endParaRPr lang="ko-KR" altLang="en-US" dirty="0"/>
-          </a:p>
-        </p:txBody>
-      </p:sp>
-      <p:cxnSp>
-        <p:nvCxnSpPr>
-          <p:cNvPr id="61" name="연결선: 꺾임 60">
-            <a:extLst>
-              <a:ext uri="{FF2B5EF4-FFF2-40B4-BE49-F238E27FC236}">
-                <a16:creationId xmlns:a16="http://schemas.microsoft.com/office/drawing/2014/main" id="{7FA83868-1B85-4AFE-BA97-96210623C884}"/>
-              </a:ext>
-            </a:extLst>
-          </p:cNvPr>
-          <p:cNvCxnSpPr>
-            <a:cxnSpLocks/>
-            <a:stCxn id="59" idx="0"/>
-            <a:endCxn id="14" idx="0"/>
-          </p:cNvCxnSpPr>
-          <p:nvPr/>
-        </p:nvCxnSpPr>
-        <p:spPr>
-          <a:xfrm rot="5400000" flipH="1" flipV="1">
-            <a:off x="5564458" y="-878311"/>
-            <a:ext cx="12700" cy="2844782"/>
-          </a:xfrm>
-          <a:prstGeom prst="bentConnector3">
-            <a:avLst>
-              <a:gd name="adj1" fmla="val 1800000"/>
-            </a:avLst>
-          </a:prstGeom>
-          <a:ln w="25400">
-            <a:solidFill>
-              <a:schemeClr val="accent2">
-                <a:lumMod val="40000"/>
-                <a:lumOff val="60000"/>
-              </a:schemeClr>
-            </a:solidFill>
-            <a:prstDash val="sysDash"/>
-          </a:ln>
-        </p:spPr>
-        <p:style>
-          <a:lnRef idx="1">
-            <a:schemeClr val="accent1"/>
-          </a:lnRef>
-          <a:fillRef idx="0">
-            <a:schemeClr val="accent1"/>
-          </a:fillRef>
-          <a:effectRef idx="0">
-            <a:schemeClr val="accent1"/>
-          </a:effectRef>
-          <a:fontRef idx="minor">
-            <a:schemeClr val="tx1"/>
-          </a:fontRef>
-        </p:style>
-      </p:cxnSp>
-      <p:sp>
-        <p:nvSpPr>
-          <p:cNvPr id="68" name="사각형: 둥근 모서리 67">
-            <a:extLst>
-              <a:ext uri="{FF2B5EF4-FFF2-40B4-BE49-F238E27FC236}">
-                <a16:creationId xmlns:a16="http://schemas.microsoft.com/office/drawing/2014/main" id="{5A2E99BA-3D65-488D-B6E0-78D0655750BF}"/>
-              </a:ext>
-            </a:extLst>
-          </p:cNvPr>
-          <p:cNvSpPr/>
-          <p:nvPr/>
-        </p:nvSpPr>
-        <p:spPr>
-          <a:xfrm>
-            <a:off x="6263455" y="4004517"/>
+            <a:off x="6263455" y="3674901"/>
             <a:ext cx="1446787" cy="578536"/>
           </a:xfrm>
           <a:prstGeom prst="roundRect">
@@ -7816,20 +7764,65 @@
           </p:cNvPr>
           <p:cNvCxnSpPr>
             <a:cxnSpLocks/>
-            <a:stCxn id="28" idx="3"/>
+            <a:stCxn id="11" idx="3"/>
             <a:endCxn id="68" idx="1"/>
           </p:cNvCxnSpPr>
           <p:nvPr/>
         </p:nvCxnSpPr>
         <p:spPr>
           <a:xfrm>
-            <a:off x="4668258" y="3519999"/>
-            <a:ext cx="1595197" cy="773786"/>
+            <a:off x="4519280" y="3354650"/>
+            <a:ext cx="1744175" cy="609519"/>
           </a:xfrm>
           <a:prstGeom prst="bentConnector3">
             <a:avLst>
               <a:gd name="adj1" fmla="val 50000"/>
             </a:avLst>
+          </a:prstGeom>
+          <a:ln w="28575">
+            <a:solidFill>
+              <a:schemeClr val="accent4"/>
+            </a:solidFill>
+          </a:ln>
+        </p:spPr>
+        <p:style>
+          <a:lnRef idx="1">
+            <a:schemeClr val="accent1"/>
+          </a:lnRef>
+          <a:fillRef idx="0">
+            <a:schemeClr val="accent1"/>
+          </a:fillRef>
+          <a:effectRef idx="0">
+            <a:schemeClr val="accent1"/>
+          </a:effectRef>
+          <a:fontRef idx="minor">
+            <a:schemeClr val="tx1"/>
+          </a:fontRef>
+        </p:style>
+      </p:cxnSp>
+      <p:cxnSp>
+        <p:nvCxnSpPr>
+          <p:cNvPr id="117" name="연결선: 꺾임 116">
+            <a:extLst>
+              <a:ext uri="{FF2B5EF4-FFF2-40B4-BE49-F238E27FC236}">
+                <a16:creationId xmlns:a16="http://schemas.microsoft.com/office/drawing/2014/main" id="{B69A1672-07F8-4604-8D11-6EDF6349CF51}"/>
+              </a:ext>
+            </a:extLst>
+          </p:cNvPr>
+          <p:cNvCxnSpPr>
+            <a:cxnSpLocks/>
+            <a:stCxn id="172" idx="2"/>
+            <a:endCxn id="84" idx="1"/>
+          </p:cNvCxnSpPr>
+          <p:nvPr/>
+        </p:nvCxnSpPr>
+        <p:spPr>
+          <a:xfrm rot="16200000" flipH="1">
+            <a:off x="5368699" y="1038242"/>
+            <a:ext cx="402188" cy="6781426"/>
+          </a:xfrm>
+          <a:prstGeom prst="bentConnector2">
+            <a:avLst/>
           </a:prstGeom>
           <a:ln w="28575">
             <a:solidFill>
@@ -7854,24 +7847,24 @@
       </p:cxnSp>
       <p:cxnSp>
         <p:nvCxnSpPr>
-          <p:cNvPr id="117" name="연결선: 꺾임 116">
-            <a:extLst>
-              <a:ext uri="{FF2B5EF4-FFF2-40B4-BE49-F238E27FC236}">
-                <a16:creationId xmlns:a16="http://schemas.microsoft.com/office/drawing/2014/main" id="{B69A1672-07F8-4604-8D11-6EDF6349CF51}"/>
+          <p:cNvPr id="118" name="연결선: 꺾임 117">
+            <a:extLst>
+              <a:ext uri="{FF2B5EF4-FFF2-40B4-BE49-F238E27FC236}">
+                <a16:creationId xmlns:a16="http://schemas.microsoft.com/office/drawing/2014/main" id="{31C177C8-5D1C-4887-BE37-5FB18EA83C1C}"/>
               </a:ext>
             </a:extLst>
           </p:cNvPr>
           <p:cNvCxnSpPr>
             <a:cxnSpLocks/>
             <a:stCxn id="68" idx="3"/>
-            <a:endCxn id="84" idx="1"/>
+            <a:endCxn id="83" idx="1"/>
           </p:cNvCxnSpPr>
           <p:nvPr/>
         </p:nvCxnSpPr>
         <p:spPr>
           <a:xfrm>
-            <a:off x="7710242" y="4293785"/>
-            <a:ext cx="1250264" cy="336264"/>
+            <a:off x="7710242" y="3964169"/>
+            <a:ext cx="1249905" cy="729"/>
           </a:xfrm>
           <a:prstGeom prst="bentConnector3">
             <a:avLst>
@@ -7899,53 +7892,6 @@
           </a:fontRef>
         </p:style>
       </p:cxnSp>
-      <p:cxnSp>
-        <p:nvCxnSpPr>
-          <p:cNvPr id="118" name="연결선: 꺾임 117">
-            <a:extLst>
-              <a:ext uri="{FF2B5EF4-FFF2-40B4-BE49-F238E27FC236}">
-                <a16:creationId xmlns:a16="http://schemas.microsoft.com/office/drawing/2014/main" id="{31C177C8-5D1C-4887-BE37-5FB18EA83C1C}"/>
-              </a:ext>
-            </a:extLst>
-          </p:cNvPr>
-          <p:cNvCxnSpPr>
-            <a:cxnSpLocks/>
-            <a:stCxn id="68" idx="3"/>
-            <a:endCxn id="83" idx="1"/>
-          </p:cNvCxnSpPr>
-          <p:nvPr/>
-        </p:nvCxnSpPr>
-        <p:spPr>
-          <a:xfrm flipV="1">
-            <a:off x="7710242" y="3964898"/>
-            <a:ext cx="1249905" cy="328887"/>
-          </a:xfrm>
-          <a:prstGeom prst="bentConnector3">
-            <a:avLst>
-              <a:gd name="adj1" fmla="val 50000"/>
-            </a:avLst>
-          </a:prstGeom>
-          <a:ln w="28575">
-            <a:solidFill>
-              <a:schemeClr val="tx1"/>
-            </a:solidFill>
-          </a:ln>
-        </p:spPr>
-        <p:style>
-          <a:lnRef idx="1">
-            <a:schemeClr val="accent1"/>
-          </a:lnRef>
-          <a:fillRef idx="0">
-            <a:schemeClr val="accent1"/>
-          </a:fillRef>
-          <a:effectRef idx="0">
-            <a:schemeClr val="accent1"/>
-          </a:effectRef>
-          <a:fontRef idx="minor">
-            <a:schemeClr val="tx1"/>
-          </a:fontRef>
-        </p:style>
-      </p:cxnSp>
       <p:sp>
         <p:nvSpPr>
           <p:cNvPr id="172" name="직사각형 171">
@@ -7960,7 +7906,7 @@
         </p:nvSpPr>
         <p:spPr>
           <a:xfrm>
-            <a:off x="2090069" y="2653138"/>
+            <a:off x="1655977" y="2481440"/>
             <a:ext cx="1046205" cy="1746421"/>
           </a:xfrm>
           <a:prstGeom prst="rect">
@@ -8010,7 +7956,7 @@
         </p:nvSpPr>
         <p:spPr>
           <a:xfrm>
-            <a:off x="608368" y="2646788"/>
+            <a:off x="248006" y="2483365"/>
             <a:ext cx="1046205" cy="1746421"/>
           </a:xfrm>
           <a:prstGeom prst="rect">
@@ -8070,15 +8016,16 @@
             </a:extLst>
           </p:cNvPr>
           <p:cNvCxnSpPr>
+            <a:cxnSpLocks/>
             <a:stCxn id="172" idx="3"/>
-            <a:endCxn id="28" idx="1"/>
+            <a:endCxn id="11" idx="1"/>
           </p:cNvCxnSpPr>
           <p:nvPr/>
         </p:nvCxnSpPr>
         <p:spPr>
           <a:xfrm flipV="1">
-            <a:off x="3136274" y="3519999"/>
-            <a:ext cx="485779" cy="6350"/>
+            <a:off x="2702182" y="3354650"/>
+            <a:ext cx="282432" cy="1"/>
           </a:xfrm>
           <a:prstGeom prst="line">
             <a:avLst/>
@@ -8120,9 +8067,9 @@
           <p:nvPr/>
         </p:nvCxnSpPr>
         <p:spPr>
-          <a:xfrm>
-            <a:off x="1654573" y="3519999"/>
-            <a:ext cx="435496" cy="6350"/>
+          <a:xfrm flipV="1">
+            <a:off x="1294211" y="3354651"/>
+            <a:ext cx="361766" cy="1925"/>
           </a:xfrm>
           <a:prstGeom prst="line">
             <a:avLst/>
@@ -8150,6 +8097,101 @@
           </a:fontRef>
         </p:style>
       </p:cxnSp>
+      <p:cxnSp>
+        <p:nvCxnSpPr>
+          <p:cNvPr id="105" name="직선 연결선 104">
+            <a:extLst>
+              <a:ext uri="{FF2B5EF4-FFF2-40B4-BE49-F238E27FC236}">
+                <a16:creationId xmlns:a16="http://schemas.microsoft.com/office/drawing/2014/main" id="{9FDFB36B-20EE-45E8-B207-A9E61562AC0F}"/>
+              </a:ext>
+            </a:extLst>
+          </p:cNvPr>
+          <p:cNvCxnSpPr>
+            <a:cxnSpLocks/>
+            <a:stCxn id="172" idx="2"/>
+            <a:endCxn id="28" idx="0"/>
+          </p:cNvCxnSpPr>
+          <p:nvPr/>
+        </p:nvCxnSpPr>
+        <p:spPr>
+          <a:xfrm flipH="1">
+            <a:off x="2179079" y="4227861"/>
+            <a:ext cx="1" cy="630770"/>
+          </a:xfrm>
+          <a:prstGeom prst="line">
+            <a:avLst/>
+          </a:prstGeom>
+          <a:ln w="38100">
+            <a:solidFill>
+              <a:schemeClr val="tx1"/>
+            </a:solidFill>
+          </a:ln>
+        </p:spPr>
+        <p:style>
+          <a:lnRef idx="1">
+            <a:schemeClr val="accent1"/>
+          </a:lnRef>
+          <a:fillRef idx="0">
+            <a:schemeClr val="accent1"/>
+          </a:fillRef>
+          <a:effectRef idx="0">
+            <a:schemeClr val="accent1"/>
+          </a:effectRef>
+          <a:fontRef idx="minor">
+            <a:schemeClr val="tx1"/>
+          </a:fontRef>
+        </p:style>
+      </p:cxnSp>
+      <p:sp>
+        <p:nvSpPr>
+          <p:cNvPr id="121" name="사각형: 둥근 모서리 120">
+            <a:extLst>
+              <a:ext uri="{FF2B5EF4-FFF2-40B4-BE49-F238E27FC236}">
+                <a16:creationId xmlns:a16="http://schemas.microsoft.com/office/drawing/2014/main" id="{10484E6E-68F0-48F7-ADA3-36B56D938200}"/>
+              </a:ext>
+            </a:extLst>
+          </p:cNvPr>
+          <p:cNvSpPr/>
+          <p:nvPr/>
+        </p:nvSpPr>
+        <p:spPr>
+          <a:xfrm>
+            <a:off x="6269805" y="5937252"/>
+            <a:ext cx="1446787" cy="584887"/>
+          </a:xfrm>
+          <a:prstGeom prst="roundRect">
+            <a:avLst/>
+          </a:prstGeom>
+        </p:spPr>
+        <p:style>
+          <a:lnRef idx="2">
+            <a:schemeClr val="accent1">
+              <a:shade val="50000"/>
+            </a:schemeClr>
+          </a:lnRef>
+          <a:fillRef idx="1">
+            <a:schemeClr val="accent1"/>
+          </a:fillRef>
+          <a:effectRef idx="0">
+            <a:schemeClr val="accent1"/>
+          </a:effectRef>
+          <a:fontRef idx="minor">
+            <a:schemeClr val="lt1"/>
+          </a:fontRef>
+        </p:style>
+        <p:txBody>
+          <a:bodyPr rtlCol="0" anchor="ctr"/>
+          <a:lstStyle/>
+          <a:p>
+            <a:pPr algn="ctr"/>
+            <a:r>
+              <a:rPr lang="en-US" altLang="ko-KR" dirty="0"/>
+              <a:t>3V3</a:t>
+            </a:r>
+            <a:endParaRPr lang="ko-KR" altLang="en-US" dirty="0"/>
+          </a:p>
+        </p:txBody>
+      </p:sp>
     </p:spTree>
     <p:extLst>
       <p:ext uri="{BB962C8B-B14F-4D97-AF65-F5344CB8AC3E}">
@@ -8180,153 +8222,189 @@
           <a:chExt cx="0" cy="0"/>
         </a:xfrm>
       </p:grpSpPr>
-      <p:cxnSp>
-        <p:nvCxnSpPr>
-          <p:cNvPr id="4" name="직선 연결선 3">
-            <a:extLst>
-              <a:ext uri="{FF2B5EF4-FFF2-40B4-BE49-F238E27FC236}">
-                <a16:creationId xmlns:a16="http://schemas.microsoft.com/office/drawing/2014/main" id="{AEC4D60A-5855-43D2-84B4-C0BEBA808B03}"/>
-              </a:ext>
-            </a:extLst>
-          </p:cNvPr>
-          <p:cNvCxnSpPr>
-            <a:cxnSpLocks/>
-          </p:cNvCxnSpPr>
-          <p:nvPr/>
-        </p:nvCxnSpPr>
-        <p:spPr>
-          <a:xfrm>
-            <a:off x="2715778" y="5082320"/>
-            <a:ext cx="6350" cy="721481"/>
-          </a:xfrm>
-          <a:prstGeom prst="line">
-            <a:avLst/>
-          </a:prstGeom>
-          <a:ln w="25400">
-            <a:solidFill>
-              <a:schemeClr val="accent2">
-                <a:lumMod val="40000"/>
-                <a:lumOff val="60000"/>
-              </a:schemeClr>
-            </a:solidFill>
-            <a:prstDash val="sysDash"/>
+      <p:sp>
+        <p:nvSpPr>
+          <p:cNvPr id="62" name="직사각형 61">
+            <a:extLst>
+              <a:ext uri="{FF2B5EF4-FFF2-40B4-BE49-F238E27FC236}">
+                <a16:creationId xmlns:a16="http://schemas.microsoft.com/office/drawing/2014/main" id="{0584E1FB-5C50-475C-8C46-5E9A8C20F505}"/>
+              </a:ext>
+            </a:extLst>
+          </p:cNvPr>
+          <p:cNvSpPr/>
+          <p:nvPr/>
+        </p:nvSpPr>
+        <p:spPr>
+          <a:xfrm>
+            <a:off x="3721393" y="1254644"/>
+            <a:ext cx="4072271" cy="2732565"/>
+          </a:xfrm>
+          <a:prstGeom prst="rect">
+            <a:avLst/>
+          </a:prstGeom>
+          <a:solidFill>
+            <a:schemeClr val="accent2">
+              <a:alpha val="50000"/>
+            </a:schemeClr>
+          </a:solidFill>
+          <a:ln>
+            <a:noFill/>
           </a:ln>
         </p:spPr>
         <p:style>
-          <a:lnRef idx="1">
-            <a:schemeClr val="accent1"/>
+          <a:lnRef idx="0">
+            <a:scrgbClr r="0" g="0" b="0"/>
           </a:lnRef>
           <a:fillRef idx="0">
-            <a:schemeClr val="accent1"/>
-          </a:fillRef>
-          <a:effectRef idx="0">
-            <a:schemeClr val="accent1"/>
-          </a:effectRef>
-          <a:fontRef idx="minor">
-            <a:schemeClr val="tx1"/>
-          </a:fontRef>
-        </p:style>
-      </p:cxnSp>
-      <p:cxnSp>
-        <p:nvCxnSpPr>
-          <p:cNvPr id="5" name="직선 연결선 4">
-            <a:extLst>
-              <a:ext uri="{FF2B5EF4-FFF2-40B4-BE49-F238E27FC236}">
-                <a16:creationId xmlns:a16="http://schemas.microsoft.com/office/drawing/2014/main" id="{5BA42B2A-081B-4D5D-9F7A-77BD1FF19203}"/>
-              </a:ext>
-            </a:extLst>
-          </p:cNvPr>
-          <p:cNvCxnSpPr>
-            <a:cxnSpLocks/>
-          </p:cNvCxnSpPr>
-          <p:nvPr/>
-        </p:nvCxnSpPr>
-        <p:spPr>
-          <a:xfrm flipH="1">
-            <a:off x="343035" y="5527910"/>
-            <a:ext cx="14069" cy="807431"/>
-          </a:xfrm>
-          <a:prstGeom prst="line">
-            <a:avLst/>
-          </a:prstGeom>
-          <a:ln w="25400">
-            <a:solidFill>
-              <a:schemeClr val="accent2">
-                <a:lumMod val="40000"/>
-                <a:lumOff val="60000"/>
-              </a:schemeClr>
-            </a:solidFill>
-            <a:prstDash val="sysDash"/>
+            <a:scrgbClr r="0" g="0" b="0"/>
+          </a:fillRef>
+          <a:effectRef idx="0">
+            <a:scrgbClr r="0" g="0" b="0"/>
+          </a:effectRef>
+          <a:fontRef idx="minor">
+            <a:schemeClr val="lt1"/>
+          </a:fontRef>
+        </p:style>
+        <p:txBody>
+          <a:bodyPr rtlCol="0" anchor="ctr"/>
+          <a:lstStyle/>
+          <a:p>
+            <a:pPr algn="ctr"/>
+            <a:endParaRPr lang="ko-KR" altLang="en-US">
+              <a:solidFill>
+                <a:schemeClr val="accent2">
+                  <a:lumMod val="20000"/>
+                  <a:lumOff val="80000"/>
+                </a:schemeClr>
+              </a:solidFill>
+            </a:endParaRPr>
+          </a:p>
+        </p:txBody>
+      </p:sp>
+      <p:sp>
+        <p:nvSpPr>
+          <p:cNvPr id="61" name="직사각형 60">
+            <a:extLst>
+              <a:ext uri="{FF2B5EF4-FFF2-40B4-BE49-F238E27FC236}">
+                <a16:creationId xmlns:a16="http://schemas.microsoft.com/office/drawing/2014/main" id="{102C8CC8-3EA6-4562-821B-A90BD99C8E5E}"/>
+              </a:ext>
+            </a:extLst>
+          </p:cNvPr>
+          <p:cNvSpPr/>
+          <p:nvPr/>
+        </p:nvSpPr>
+        <p:spPr>
+          <a:xfrm>
+            <a:off x="2013096" y="4300873"/>
+            <a:ext cx="3785724" cy="1802215"/>
+          </a:xfrm>
+          <a:prstGeom prst="rect">
+            <a:avLst/>
+          </a:prstGeom>
+          <a:solidFill>
+            <a:schemeClr val="accent2">
+              <a:alpha val="50000"/>
+            </a:schemeClr>
+          </a:solidFill>
+          <a:ln>
+            <a:noFill/>
           </a:ln>
         </p:spPr>
         <p:style>
-          <a:lnRef idx="1">
-            <a:schemeClr val="accent1"/>
+          <a:lnRef idx="0">
+            <a:scrgbClr r="0" g="0" b="0"/>
           </a:lnRef>
           <a:fillRef idx="0">
-            <a:schemeClr val="accent1"/>
-          </a:fillRef>
-          <a:effectRef idx="0">
-            <a:schemeClr val="accent1"/>
-          </a:effectRef>
-          <a:fontRef idx="minor">
-            <a:schemeClr val="tx1"/>
-          </a:fontRef>
-        </p:style>
-      </p:cxnSp>
-      <p:cxnSp>
-        <p:nvCxnSpPr>
-          <p:cNvPr id="6" name="직선 연결선 5">
-            <a:extLst>
-              <a:ext uri="{FF2B5EF4-FFF2-40B4-BE49-F238E27FC236}">
-                <a16:creationId xmlns:a16="http://schemas.microsoft.com/office/drawing/2014/main" id="{5F1CA7AC-3F30-4523-95C2-990A914D769A}"/>
-              </a:ext>
-            </a:extLst>
-          </p:cNvPr>
-          <p:cNvCxnSpPr>
-            <a:cxnSpLocks/>
-          </p:cNvCxnSpPr>
-          <p:nvPr/>
-        </p:nvCxnSpPr>
-        <p:spPr>
-          <a:xfrm>
-            <a:off x="2182306" y="4657203"/>
-            <a:ext cx="6177" cy="2143101"/>
-          </a:xfrm>
-          <a:prstGeom prst="line">
-            <a:avLst/>
-          </a:prstGeom>
-          <a:ln w="25400">
-            <a:solidFill>
-              <a:schemeClr val="accent2">
-                <a:lumMod val="40000"/>
-                <a:lumOff val="60000"/>
-              </a:schemeClr>
-            </a:solidFill>
-            <a:prstDash val="sysDash"/>
+            <a:scrgbClr r="0" g="0" b="0"/>
+          </a:fillRef>
+          <a:effectRef idx="0">
+            <a:scrgbClr r="0" g="0" b="0"/>
+          </a:effectRef>
+          <a:fontRef idx="minor">
+            <a:schemeClr val="lt1"/>
+          </a:fontRef>
+        </p:style>
+        <p:txBody>
+          <a:bodyPr rtlCol="0" anchor="ctr"/>
+          <a:lstStyle/>
+          <a:p>
+            <a:pPr algn="ctr"/>
+            <a:endParaRPr lang="ko-KR" altLang="en-US">
+              <a:solidFill>
+                <a:schemeClr val="accent2">
+                  <a:lumMod val="20000"/>
+                  <a:lumOff val="80000"/>
+                </a:schemeClr>
+              </a:solidFill>
+            </a:endParaRPr>
+          </a:p>
+        </p:txBody>
+      </p:sp>
+      <p:sp>
+        <p:nvSpPr>
+          <p:cNvPr id="7" name="직사각형 6">
+            <a:extLst>
+              <a:ext uri="{FF2B5EF4-FFF2-40B4-BE49-F238E27FC236}">
+                <a16:creationId xmlns:a16="http://schemas.microsoft.com/office/drawing/2014/main" id="{4CA99BC3-AA79-4391-8095-8A2A41BAB08C}"/>
+              </a:ext>
+            </a:extLst>
+          </p:cNvPr>
+          <p:cNvSpPr/>
+          <p:nvPr/>
+        </p:nvSpPr>
+        <p:spPr>
+          <a:xfrm>
+            <a:off x="1882701" y="4189228"/>
+            <a:ext cx="1111426" cy="1802215"/>
+          </a:xfrm>
+          <a:prstGeom prst="rect">
+            <a:avLst/>
+          </a:prstGeom>
+          <a:solidFill>
+            <a:schemeClr val="accent4">
+              <a:alpha val="50000"/>
+            </a:schemeClr>
+          </a:solidFill>
+          <a:ln>
+            <a:noFill/>
           </a:ln>
         </p:spPr>
         <p:style>
-          <a:lnRef idx="1">
-            <a:schemeClr val="accent1"/>
+          <a:lnRef idx="0">
+            <a:scrgbClr r="0" g="0" b="0"/>
           </a:lnRef>
           <a:fillRef idx="0">
-            <a:schemeClr val="accent1"/>
-          </a:fillRef>
-          <a:effectRef idx="0">
-            <a:schemeClr val="accent1"/>
-          </a:effectRef>
-          <a:fontRef idx="minor">
-            <a:schemeClr val="tx1"/>
-          </a:fontRef>
-        </p:style>
-      </p:cxnSp>
-      <p:sp>
-        <p:nvSpPr>
-          <p:cNvPr id="10" name="직사각형 9">
-            <a:extLst>
-              <a:ext uri="{FF2B5EF4-FFF2-40B4-BE49-F238E27FC236}">
-                <a16:creationId xmlns:a16="http://schemas.microsoft.com/office/drawing/2014/main" id="{AD482F53-D87D-44B7-919D-C19070BB9B58}"/>
+            <a:scrgbClr r="0" g="0" b="0"/>
+          </a:fillRef>
+          <a:effectRef idx="0">
+            <a:scrgbClr r="0" g="0" b="0"/>
+          </a:effectRef>
+          <a:fontRef idx="minor">
+            <a:schemeClr val="lt1"/>
+          </a:fontRef>
+        </p:style>
+        <p:txBody>
+          <a:bodyPr rtlCol="0" anchor="ctr"/>
+          <a:lstStyle/>
+          <a:p>
+            <a:pPr algn="ctr"/>
+            <a:endParaRPr lang="ko-KR" altLang="en-US">
+              <a:solidFill>
+                <a:schemeClr val="accent2">
+                  <a:lumMod val="20000"/>
+                  <a:lumOff val="80000"/>
+                </a:schemeClr>
+              </a:solidFill>
+            </a:endParaRPr>
+          </a:p>
+        </p:txBody>
+      </p:sp>
+      <p:sp>
+        <p:nvSpPr>
+          <p:cNvPr id="2" name="사각형: 둥근 모서리 1">
+            <a:extLst>
+              <a:ext uri="{FF2B5EF4-FFF2-40B4-BE49-F238E27FC236}">
+                <a16:creationId xmlns:a16="http://schemas.microsoft.com/office/drawing/2014/main" id="{32C3194D-AAC0-48BC-AB52-773A115EDD2D}"/>
               </a:ext>
             </a:extLst>
           </p:cNvPr>
@@ -8335,10 +8413,10 @@
         </p:nvSpPr>
         <p:spPr>
           <a:xfrm>
-            <a:off x="4427907" y="1227181"/>
-            <a:ext cx="1601375" cy="1080022"/>
-          </a:xfrm>
-          <a:prstGeom prst="rect">
+            <a:off x="2094613" y="4400994"/>
+            <a:ext cx="637954" cy="627321"/>
+          </a:xfrm>
+          <a:prstGeom prst="roundRect">
             <a:avLst/>
           </a:prstGeom>
         </p:spPr>
@@ -8364,19 +8442,19 @@
           <a:p>
             <a:pPr algn="ctr"/>
             <a:r>
-              <a:rPr lang="en-US" altLang="ko-KR" dirty="0"/>
-              <a:t>Display</a:t>
-            </a:r>
-            <a:endParaRPr lang="ko-KR" altLang="en-US" dirty="0"/>
-          </a:p>
-        </p:txBody>
-      </p:sp>
-      <p:sp>
-        <p:nvSpPr>
-          <p:cNvPr id="11" name="직사각형 10">
-            <a:extLst>
-              <a:ext uri="{FF2B5EF4-FFF2-40B4-BE49-F238E27FC236}">
-                <a16:creationId xmlns:a16="http://schemas.microsoft.com/office/drawing/2014/main" id="{A2CB8C79-5B40-40E5-BB23-4BA5F7D1F059}"/>
+              <a:rPr lang="en-US" altLang="ko-KR" sz="900" dirty="0" err="1"/>
+              <a:t>RPi</a:t>
+            </a:r>
+            <a:endParaRPr lang="ko-KR" altLang="en-US" sz="900" dirty="0"/>
+          </a:p>
+        </p:txBody>
+      </p:sp>
+      <p:sp>
+        <p:nvSpPr>
+          <p:cNvPr id="45" name="사각형: 둥근 모서리 44">
+            <a:extLst>
+              <a:ext uri="{FF2B5EF4-FFF2-40B4-BE49-F238E27FC236}">
+                <a16:creationId xmlns:a16="http://schemas.microsoft.com/office/drawing/2014/main" id="{2DF07AA3-B7FE-4652-93CC-3B6081D01067}"/>
               </a:ext>
             </a:extLst>
           </p:cNvPr>
@@ -8385,10 +8463,10 @@
         </p:nvSpPr>
         <p:spPr>
           <a:xfrm>
-            <a:off x="9500439" y="1546624"/>
-            <a:ext cx="2106843" cy="612000"/>
-          </a:xfrm>
-          <a:prstGeom prst="rect">
+            <a:off x="5952283" y="1626781"/>
+            <a:ext cx="637954" cy="627321"/>
+          </a:xfrm>
+          <a:prstGeom prst="roundRect">
             <a:avLst/>
           </a:prstGeom>
         </p:spPr>
@@ -8414,19 +8492,19 @@
           <a:p>
             <a:pPr algn="ctr"/>
             <a:r>
-              <a:rPr lang="en-US" altLang="ko-KR" dirty="0"/>
-              <a:t>GPS</a:t>
-            </a:r>
-            <a:endParaRPr lang="ko-KR" altLang="en-US" dirty="0"/>
-          </a:p>
-        </p:txBody>
-      </p:sp>
-      <p:sp>
-        <p:nvSpPr>
-          <p:cNvPr id="12" name="직사각형 11">
-            <a:extLst>
-              <a:ext uri="{FF2B5EF4-FFF2-40B4-BE49-F238E27FC236}">
-                <a16:creationId xmlns:a16="http://schemas.microsoft.com/office/drawing/2014/main" id="{62BE5839-A5E5-4720-AD48-F891A280B3A3}"/>
+              <a:rPr lang="en-US" altLang="ko-KR" sz="900" dirty="0"/>
+              <a:t>IMU</a:t>
+            </a:r>
+            <a:endParaRPr lang="ko-KR" altLang="en-US" sz="900" dirty="0"/>
+          </a:p>
+        </p:txBody>
+      </p:sp>
+      <p:sp>
+        <p:nvSpPr>
+          <p:cNvPr id="46" name="사각형: 둥근 모서리 45">
+            <a:extLst>
+              <a:ext uri="{FF2B5EF4-FFF2-40B4-BE49-F238E27FC236}">
+                <a16:creationId xmlns:a16="http://schemas.microsoft.com/office/drawing/2014/main" id="{F036D120-DE6B-4CD2-98ED-D192046B4789}"/>
               </a:ext>
             </a:extLst>
           </p:cNvPr>
@@ -8435,10 +8513,10 @@
         </p:nvSpPr>
         <p:spPr>
           <a:xfrm>
-            <a:off x="9500439" y="756768"/>
-            <a:ext cx="2106843" cy="612000"/>
-          </a:xfrm>
-          <a:prstGeom prst="rect">
+            <a:off x="5952283" y="2371060"/>
+            <a:ext cx="637954" cy="627321"/>
+          </a:xfrm>
+          <a:prstGeom prst="roundRect">
             <a:avLst/>
           </a:prstGeom>
         </p:spPr>
@@ -8464,19 +8542,19 @@
           <a:p>
             <a:pPr algn="ctr"/>
             <a:r>
-              <a:rPr lang="en-US" altLang="ko-KR" dirty="0"/>
-              <a:t>IMU</a:t>
-            </a:r>
-            <a:endParaRPr lang="ko-KR" altLang="en-US" dirty="0"/>
-          </a:p>
-        </p:txBody>
-      </p:sp>
-      <p:sp>
-        <p:nvSpPr>
-          <p:cNvPr id="14" name="직사각형 13">
-            <a:extLst>
-              <a:ext uri="{FF2B5EF4-FFF2-40B4-BE49-F238E27FC236}">
-                <a16:creationId xmlns:a16="http://schemas.microsoft.com/office/drawing/2014/main" id="{5A7A0499-3B8D-45BA-B4F3-B45974B43056}"/>
+              <a:rPr lang="en-US" altLang="ko-KR" sz="900" dirty="0"/>
+              <a:t>GPS</a:t>
+            </a:r>
+            <a:endParaRPr lang="ko-KR" altLang="en-US" sz="900" dirty="0"/>
+          </a:p>
+        </p:txBody>
+      </p:sp>
+      <p:sp>
+        <p:nvSpPr>
+          <p:cNvPr id="47" name="사각형: 둥근 모서리 46">
+            <a:extLst>
+              <a:ext uri="{FF2B5EF4-FFF2-40B4-BE49-F238E27FC236}">
+                <a16:creationId xmlns:a16="http://schemas.microsoft.com/office/drawing/2014/main" id="{169BAE08-39E5-4122-9D60-805B92B57E4A}"/>
               </a:ext>
             </a:extLst>
           </p:cNvPr>
@@ -8485,10 +8563,10 @@
         </p:nvSpPr>
         <p:spPr>
           <a:xfrm>
-            <a:off x="2294082" y="717432"/>
-            <a:ext cx="1723890" cy="1650206"/>
-          </a:xfrm>
-          <a:prstGeom prst="rect">
+            <a:off x="4882116" y="3115339"/>
+            <a:ext cx="637954" cy="627321"/>
+          </a:xfrm>
+          <a:prstGeom prst="roundRect">
             <a:avLst/>
           </a:prstGeom>
         </p:spPr>
@@ -8514,19 +8592,19 @@
           <a:p>
             <a:pPr algn="ctr"/>
             <a:r>
-              <a:rPr lang="en-US" altLang="ko-KR" dirty="0"/>
-              <a:t>RPI</a:t>
-            </a:r>
-            <a:endParaRPr lang="ko-KR" altLang="en-US" dirty="0"/>
-          </a:p>
-        </p:txBody>
-      </p:sp>
-      <p:sp>
-        <p:nvSpPr>
-          <p:cNvPr id="15" name="직사각형 14">
-            <a:extLst>
-              <a:ext uri="{FF2B5EF4-FFF2-40B4-BE49-F238E27FC236}">
-                <a16:creationId xmlns:a16="http://schemas.microsoft.com/office/drawing/2014/main" id="{EB493F1A-E39D-4393-A642-B201711F00EC}"/>
+              <a:rPr lang="en-US" altLang="ko-KR" sz="900" dirty="0"/>
+              <a:t>EPD</a:t>
+            </a:r>
+            <a:endParaRPr lang="ko-KR" altLang="en-US" sz="900" dirty="0"/>
+          </a:p>
+        </p:txBody>
+      </p:sp>
+      <p:sp>
+        <p:nvSpPr>
+          <p:cNvPr id="48" name="사각형: 둥근 모서리 47">
+            <a:extLst>
+              <a:ext uri="{FF2B5EF4-FFF2-40B4-BE49-F238E27FC236}">
+                <a16:creationId xmlns:a16="http://schemas.microsoft.com/office/drawing/2014/main" id="{8B988B8E-E905-4347-9F9C-C51B450DC1AC}"/>
               </a:ext>
             </a:extLst>
           </p:cNvPr>
@@ -8535,10 +8613,10 @@
         </p:nvSpPr>
         <p:spPr>
           <a:xfrm>
-            <a:off x="2575597" y="2860109"/>
-            <a:ext cx="2029354" cy="671383"/>
-          </a:xfrm>
-          <a:prstGeom prst="rect">
+            <a:off x="5952283" y="3115339"/>
+            <a:ext cx="637954" cy="627321"/>
+          </a:xfrm>
+          <a:prstGeom prst="roundRect">
             <a:avLst/>
           </a:prstGeom>
         </p:spPr>
@@ -8564,19 +8642,18 @@
           <a:p>
             <a:pPr algn="ctr"/>
             <a:r>
-              <a:rPr lang="en-US" altLang="ko-KR" dirty="0"/>
-              <a:t>AMP</a:t>
-            </a:r>
-            <a:endParaRPr lang="ko-KR" altLang="en-US" dirty="0"/>
-          </a:p>
-        </p:txBody>
-      </p:sp>
-      <p:sp>
-        <p:nvSpPr>
-          <p:cNvPr id="17" name="직사각형 16">
-            <a:extLst>
-              <a:ext uri="{FF2B5EF4-FFF2-40B4-BE49-F238E27FC236}">
-                <a16:creationId xmlns:a16="http://schemas.microsoft.com/office/drawing/2014/main" id="{1D4470B6-9E5E-4F6F-B2BE-4D7D7C254767}"/>
+              <a:rPr lang="en-US" altLang="ko-KR" sz="900" dirty="0"/>
+              <a:t>ROM</a:t>
+            </a:r>
+          </a:p>
+        </p:txBody>
+      </p:sp>
+      <p:sp>
+        <p:nvSpPr>
+          <p:cNvPr id="49" name="사각형: 둥근 모서리 48">
+            <a:extLst>
+              <a:ext uri="{FF2B5EF4-FFF2-40B4-BE49-F238E27FC236}">
+                <a16:creationId xmlns:a16="http://schemas.microsoft.com/office/drawing/2014/main" id="{E4AA426E-3630-4504-AC7D-9E93EFC0B5E0}"/>
               </a:ext>
             </a:extLst>
           </p:cNvPr>
@@ -8585,10 +8662,10 @@
         </p:nvSpPr>
         <p:spPr>
           <a:xfrm>
-            <a:off x="6752603" y="762852"/>
-            <a:ext cx="2029355" cy="4555198"/>
-          </a:xfrm>
-          <a:prstGeom prst="rect">
+            <a:off x="3632080" y="5289699"/>
+            <a:ext cx="637954" cy="627321"/>
+          </a:xfrm>
+          <a:prstGeom prst="roundRect">
             <a:avLst/>
           </a:prstGeom>
         </p:spPr>
@@ -8614,234 +8691,18 @@
           <a:p>
             <a:pPr algn="ctr"/>
             <a:r>
-              <a:rPr lang="en-US" altLang="ko-KR" dirty="0"/>
-              <a:t>MCU</a:t>
-            </a:r>
-            <a:endParaRPr lang="ko-KR" altLang="en-US" dirty="0"/>
-          </a:p>
-        </p:txBody>
-      </p:sp>
-      <p:cxnSp>
-        <p:nvCxnSpPr>
-          <p:cNvPr id="18" name="직선 연결선 17">
-            <a:extLst>
-              <a:ext uri="{FF2B5EF4-FFF2-40B4-BE49-F238E27FC236}">
-                <a16:creationId xmlns:a16="http://schemas.microsoft.com/office/drawing/2014/main" id="{CAAEA6BB-5A3C-4F24-9597-3223DB546EA7}"/>
-              </a:ext>
-            </a:extLst>
-          </p:cNvPr>
-          <p:cNvCxnSpPr>
-            <a:cxnSpLocks/>
-          </p:cNvCxnSpPr>
-          <p:nvPr/>
-        </p:nvCxnSpPr>
-        <p:spPr>
-          <a:xfrm flipV="1">
-            <a:off x="79005" y="5321303"/>
-            <a:ext cx="1250263" cy="1"/>
-          </a:xfrm>
-          <a:prstGeom prst="line">
-            <a:avLst/>
-          </a:prstGeom>
-          <a:ln w="38100">
-            <a:solidFill>
-              <a:srgbClr val="FF0000"/>
-            </a:solidFill>
-          </a:ln>
-        </p:spPr>
-        <p:style>
-          <a:lnRef idx="1">
-            <a:schemeClr val="accent1"/>
-          </a:lnRef>
-          <a:fillRef idx="0">
-            <a:schemeClr val="accent1"/>
-          </a:fillRef>
-          <a:effectRef idx="0">
-            <a:schemeClr val="accent1"/>
-          </a:effectRef>
-          <a:fontRef idx="minor">
-            <a:schemeClr val="tx1"/>
-          </a:fontRef>
-        </p:style>
-      </p:cxnSp>
-      <p:cxnSp>
-        <p:nvCxnSpPr>
-          <p:cNvPr id="19" name="직선 연결선 18">
-            <a:extLst>
-              <a:ext uri="{FF2B5EF4-FFF2-40B4-BE49-F238E27FC236}">
-                <a16:creationId xmlns:a16="http://schemas.microsoft.com/office/drawing/2014/main" id="{817A53ED-7456-42DC-9B4F-79F1928E11DF}"/>
-              </a:ext>
-            </a:extLst>
-          </p:cNvPr>
-          <p:cNvCxnSpPr>
-            <a:cxnSpLocks/>
-          </p:cNvCxnSpPr>
-          <p:nvPr/>
-        </p:nvCxnSpPr>
-        <p:spPr>
-          <a:xfrm flipV="1">
-            <a:off x="704137" y="6586667"/>
-            <a:ext cx="1243913" cy="4453"/>
-          </a:xfrm>
-          <a:prstGeom prst="line">
-            <a:avLst/>
-          </a:prstGeom>
-          <a:ln w="38100">
-            <a:solidFill>
-              <a:srgbClr val="FF0000"/>
-            </a:solidFill>
-          </a:ln>
-        </p:spPr>
-        <p:style>
-          <a:lnRef idx="1">
-            <a:schemeClr val="accent1"/>
-          </a:lnRef>
-          <a:fillRef idx="0">
-            <a:schemeClr val="accent1"/>
-          </a:fillRef>
-          <a:effectRef idx="0">
-            <a:schemeClr val="accent1"/>
-          </a:effectRef>
-          <a:fontRef idx="minor">
-            <a:schemeClr val="tx1"/>
-          </a:fontRef>
-        </p:style>
-      </p:cxnSp>
-      <p:cxnSp>
-        <p:nvCxnSpPr>
-          <p:cNvPr id="20" name="직선 연결선 19">
-            <a:extLst>
-              <a:ext uri="{FF2B5EF4-FFF2-40B4-BE49-F238E27FC236}">
-                <a16:creationId xmlns:a16="http://schemas.microsoft.com/office/drawing/2014/main" id="{54833C84-5515-48C6-84DF-002C13CDBF32}"/>
-              </a:ext>
-            </a:extLst>
-          </p:cNvPr>
-          <p:cNvCxnSpPr>
-            <a:cxnSpLocks/>
-          </p:cNvCxnSpPr>
-          <p:nvPr/>
-        </p:nvCxnSpPr>
-        <p:spPr>
-          <a:xfrm>
-            <a:off x="672450" y="5755140"/>
-            <a:ext cx="1250263" cy="0"/>
-          </a:xfrm>
-          <a:prstGeom prst="line">
-            <a:avLst/>
-          </a:prstGeom>
-          <a:ln w="38100">
-            <a:solidFill>
-              <a:srgbClr val="FF0000"/>
-            </a:solidFill>
-          </a:ln>
-        </p:spPr>
-        <p:style>
-          <a:lnRef idx="1">
-            <a:schemeClr val="accent1"/>
-          </a:lnRef>
-          <a:fillRef idx="0">
-            <a:schemeClr val="accent1"/>
-          </a:fillRef>
-          <a:effectRef idx="0">
-            <a:schemeClr val="accent1"/>
-          </a:effectRef>
-          <a:fontRef idx="minor">
-            <a:schemeClr val="tx1"/>
-          </a:fontRef>
-        </p:style>
-      </p:cxnSp>
-      <p:cxnSp>
-        <p:nvCxnSpPr>
-          <p:cNvPr id="21" name="연결선: 꺾임 20">
-            <a:extLst>
-              <a:ext uri="{FF2B5EF4-FFF2-40B4-BE49-F238E27FC236}">
-                <a16:creationId xmlns:a16="http://schemas.microsoft.com/office/drawing/2014/main" id="{DCA27568-4A4B-4FA0-B670-4B57E9FDE937}"/>
-              </a:ext>
-            </a:extLst>
-          </p:cNvPr>
-          <p:cNvCxnSpPr>
-            <a:cxnSpLocks/>
-          </p:cNvCxnSpPr>
-          <p:nvPr/>
-        </p:nvCxnSpPr>
-        <p:spPr>
-          <a:xfrm flipV="1">
-            <a:off x="2503829" y="6473520"/>
-            <a:ext cx="1244086" cy="392305"/>
-          </a:xfrm>
-          <a:prstGeom prst="bentConnector3">
-            <a:avLst/>
-          </a:prstGeom>
-          <a:ln w="38100">
-            <a:solidFill>
-              <a:schemeClr val="accent4"/>
-            </a:solidFill>
-          </a:ln>
-        </p:spPr>
-        <p:style>
-          <a:lnRef idx="1">
-            <a:schemeClr val="accent1"/>
-          </a:lnRef>
-          <a:fillRef idx="0">
-            <a:schemeClr val="accent1"/>
-          </a:fillRef>
-          <a:effectRef idx="0">
-            <a:schemeClr val="accent1"/>
-          </a:effectRef>
-          <a:fontRef idx="minor">
-            <a:schemeClr val="tx1"/>
-          </a:fontRef>
-        </p:style>
-      </p:cxnSp>
-      <p:cxnSp>
-        <p:nvCxnSpPr>
-          <p:cNvPr id="22" name="연결선: 꺾임 21">
-            <a:extLst>
-              <a:ext uri="{FF2B5EF4-FFF2-40B4-BE49-F238E27FC236}">
-                <a16:creationId xmlns:a16="http://schemas.microsoft.com/office/drawing/2014/main" id="{8E576C64-EB99-4699-85AC-3248B4B91530}"/>
-              </a:ext>
-            </a:extLst>
-          </p:cNvPr>
-          <p:cNvCxnSpPr>
-            <a:cxnSpLocks/>
-          </p:cNvCxnSpPr>
-          <p:nvPr/>
-        </p:nvCxnSpPr>
-        <p:spPr>
-          <a:xfrm>
-            <a:off x="1902456" y="6169479"/>
-            <a:ext cx="1244086" cy="392305"/>
-          </a:xfrm>
-          <a:prstGeom prst="bentConnector3">
-            <a:avLst/>
-          </a:prstGeom>
-          <a:ln w="38100">
-            <a:solidFill>
-              <a:schemeClr val="accent4"/>
-            </a:solidFill>
-          </a:ln>
-        </p:spPr>
-        <p:style>
-          <a:lnRef idx="1">
-            <a:schemeClr val="accent1"/>
-          </a:lnRef>
-          <a:fillRef idx="0">
-            <a:schemeClr val="accent1"/>
-          </a:fillRef>
-          <a:effectRef idx="0">
-            <a:schemeClr val="accent1"/>
-          </a:effectRef>
-          <a:fontRef idx="minor">
-            <a:schemeClr val="tx1"/>
-          </a:fontRef>
-        </p:style>
-      </p:cxnSp>
-      <p:sp>
-        <p:nvSpPr>
-          <p:cNvPr id="23" name="직사각형 22">
-            <a:extLst>
-              <a:ext uri="{FF2B5EF4-FFF2-40B4-BE49-F238E27FC236}">
-                <a16:creationId xmlns:a16="http://schemas.microsoft.com/office/drawing/2014/main" id="{E515553B-49A4-49E5-B623-60E767016825}"/>
+              <a:rPr lang="en-US" altLang="ko-KR" sz="900" dirty="0"/>
+              <a:t>FM</a:t>
+            </a:r>
+          </a:p>
+        </p:txBody>
+      </p:sp>
+      <p:sp>
+        <p:nvSpPr>
+          <p:cNvPr id="55" name="사각형: 둥근 모서리 54">
+            <a:extLst>
+              <a:ext uri="{FF2B5EF4-FFF2-40B4-BE49-F238E27FC236}">
+                <a16:creationId xmlns:a16="http://schemas.microsoft.com/office/drawing/2014/main" id="{550EDF06-DDEC-4F32-AF11-C66155FBB9FA}"/>
               </a:ext>
             </a:extLst>
           </p:cNvPr>
@@ -8850,10 +8711,10 @@
         </p:nvSpPr>
         <p:spPr>
           <a:xfrm>
-            <a:off x="3622053" y="3782786"/>
-            <a:ext cx="1046205" cy="610423"/>
-          </a:xfrm>
-          <a:prstGeom prst="rect">
+            <a:off x="2582293" y="5296049"/>
+            <a:ext cx="637954" cy="627321"/>
+          </a:xfrm>
+          <a:prstGeom prst="roundRect">
             <a:avLst/>
           </a:prstGeom>
         </p:spPr>
@@ -8879,410 +8740,18 @@
           <a:p>
             <a:pPr algn="ctr"/>
             <a:r>
-              <a:rPr lang="en-US" altLang="ko-KR" dirty="0"/>
-              <a:t>Battery</a:t>
-            </a:r>
-            <a:endParaRPr lang="ko-KR" altLang="en-US" dirty="0"/>
-          </a:p>
-        </p:txBody>
-      </p:sp>
-      <p:cxnSp>
-        <p:nvCxnSpPr>
-          <p:cNvPr id="24" name="연결선: 꺾임 23">
-            <a:extLst>
-              <a:ext uri="{FF2B5EF4-FFF2-40B4-BE49-F238E27FC236}">
-                <a16:creationId xmlns:a16="http://schemas.microsoft.com/office/drawing/2014/main" id="{C98E31C4-42A6-4E37-9B64-FE0B27DC295D}"/>
-              </a:ext>
-            </a:extLst>
-          </p:cNvPr>
-          <p:cNvCxnSpPr>
-            <a:cxnSpLocks/>
-          </p:cNvCxnSpPr>
-          <p:nvPr/>
-        </p:nvCxnSpPr>
-        <p:spPr>
-          <a:xfrm flipV="1">
-            <a:off x="2708497" y="4774043"/>
-            <a:ext cx="1595197" cy="2683475"/>
-          </a:xfrm>
-          <a:prstGeom prst="bentConnector3">
-            <a:avLst/>
-          </a:prstGeom>
-          <a:ln w="28575">
-            <a:solidFill>
-              <a:schemeClr val="tx1"/>
-            </a:solidFill>
-          </a:ln>
-        </p:spPr>
-        <p:style>
-          <a:lnRef idx="1">
-            <a:schemeClr val="accent1"/>
-          </a:lnRef>
-          <a:fillRef idx="0">
-            <a:schemeClr val="accent1"/>
-          </a:fillRef>
-          <a:effectRef idx="0">
-            <a:schemeClr val="accent1"/>
-          </a:effectRef>
-          <a:fontRef idx="minor">
-            <a:schemeClr val="tx1"/>
-          </a:fontRef>
-        </p:style>
-      </p:cxnSp>
-      <p:cxnSp>
-        <p:nvCxnSpPr>
-          <p:cNvPr id="25" name="연결선: 꺾임 24">
-            <a:extLst>
-              <a:ext uri="{FF2B5EF4-FFF2-40B4-BE49-F238E27FC236}">
-                <a16:creationId xmlns:a16="http://schemas.microsoft.com/office/drawing/2014/main" id="{769916B7-1519-4650-A755-88D956580D1C}"/>
-              </a:ext>
-            </a:extLst>
-          </p:cNvPr>
-          <p:cNvCxnSpPr>
-            <a:cxnSpLocks/>
-          </p:cNvCxnSpPr>
-          <p:nvPr/>
-        </p:nvCxnSpPr>
-        <p:spPr>
-          <a:xfrm flipV="1">
-            <a:off x="3320245" y="5192192"/>
-            <a:ext cx="1595197" cy="1682704"/>
-          </a:xfrm>
-          <a:prstGeom prst="bentConnector3">
-            <a:avLst/>
-          </a:prstGeom>
-          <a:ln w="28575">
-            <a:solidFill>
-              <a:schemeClr val="tx1"/>
-            </a:solidFill>
-          </a:ln>
-        </p:spPr>
-        <p:style>
-          <a:lnRef idx="1">
-            <a:schemeClr val="accent1"/>
-          </a:lnRef>
-          <a:fillRef idx="0">
-            <a:schemeClr val="accent1"/>
-          </a:fillRef>
-          <a:effectRef idx="0">
-            <a:schemeClr val="accent1"/>
-          </a:effectRef>
-          <a:fontRef idx="minor">
-            <a:schemeClr val="tx1"/>
-          </a:fontRef>
-        </p:style>
-      </p:cxnSp>
-      <p:cxnSp>
-        <p:nvCxnSpPr>
-          <p:cNvPr id="26" name="연결선: 꺾임 25">
-            <a:extLst>
-              <a:ext uri="{FF2B5EF4-FFF2-40B4-BE49-F238E27FC236}">
-                <a16:creationId xmlns:a16="http://schemas.microsoft.com/office/drawing/2014/main" id="{3ADA3098-328A-43D6-ABD9-906894D4254F}"/>
-              </a:ext>
-            </a:extLst>
-          </p:cNvPr>
-          <p:cNvCxnSpPr>
-            <a:cxnSpLocks/>
-          </p:cNvCxnSpPr>
-          <p:nvPr/>
-        </p:nvCxnSpPr>
-        <p:spPr>
-          <a:xfrm flipV="1">
-            <a:off x="3590274" y="5767123"/>
-            <a:ext cx="1601547" cy="961223"/>
-          </a:xfrm>
-          <a:prstGeom prst="bentConnector3">
-            <a:avLst/>
-          </a:prstGeom>
-          <a:ln w="28575">
-            <a:solidFill>
-              <a:schemeClr val="tx1"/>
-            </a:solidFill>
-          </a:ln>
-        </p:spPr>
-        <p:style>
-          <a:lnRef idx="1">
-            <a:schemeClr val="accent1"/>
-          </a:lnRef>
-          <a:fillRef idx="0">
-            <a:schemeClr val="accent1"/>
-          </a:fillRef>
-          <a:effectRef idx="0">
-            <a:schemeClr val="accent1"/>
-          </a:effectRef>
-          <a:fontRef idx="minor">
-            <a:schemeClr val="tx1"/>
-          </a:fontRef>
-        </p:style>
-      </p:cxnSp>
-      <p:cxnSp>
-        <p:nvCxnSpPr>
-          <p:cNvPr id="27" name="연결선: 꺾임 26">
-            <a:extLst>
-              <a:ext uri="{FF2B5EF4-FFF2-40B4-BE49-F238E27FC236}">
-                <a16:creationId xmlns:a16="http://schemas.microsoft.com/office/drawing/2014/main" id="{2B986377-954C-4909-BB38-CA02B6CE75F7}"/>
-              </a:ext>
-            </a:extLst>
-          </p:cNvPr>
-          <p:cNvCxnSpPr>
-            <a:cxnSpLocks/>
-          </p:cNvCxnSpPr>
-          <p:nvPr/>
-        </p:nvCxnSpPr>
-        <p:spPr>
-          <a:xfrm flipV="1">
-            <a:off x="3875020" y="6539043"/>
-            <a:ext cx="1595197" cy="261261"/>
-          </a:xfrm>
-          <a:prstGeom prst="bentConnector3">
-            <a:avLst/>
-          </a:prstGeom>
-          <a:ln w="28575">
-            <a:solidFill>
-              <a:schemeClr val="tx1"/>
-            </a:solidFill>
-          </a:ln>
-        </p:spPr>
-        <p:style>
-          <a:lnRef idx="1">
-            <a:schemeClr val="accent1"/>
-          </a:lnRef>
-          <a:fillRef idx="0">
-            <a:schemeClr val="accent1"/>
-          </a:fillRef>
-          <a:effectRef idx="0">
-            <a:schemeClr val="accent1"/>
-          </a:effectRef>
-          <a:fontRef idx="minor">
-            <a:schemeClr val="tx1"/>
-          </a:fontRef>
-        </p:style>
-      </p:cxnSp>
-      <p:cxnSp>
-        <p:nvCxnSpPr>
-          <p:cNvPr id="28" name="연결선: 꺾임 27">
-            <a:extLst>
-              <a:ext uri="{FF2B5EF4-FFF2-40B4-BE49-F238E27FC236}">
-                <a16:creationId xmlns:a16="http://schemas.microsoft.com/office/drawing/2014/main" id="{F3A1C3A9-6B3E-49BC-8256-94A26F1ACAFD}"/>
-              </a:ext>
-            </a:extLst>
-          </p:cNvPr>
-          <p:cNvCxnSpPr>
-            <a:cxnSpLocks/>
-          </p:cNvCxnSpPr>
-          <p:nvPr/>
-        </p:nvCxnSpPr>
-        <p:spPr>
-          <a:xfrm>
-            <a:off x="3622053" y="4862779"/>
-            <a:ext cx="1601374" cy="2317393"/>
-          </a:xfrm>
-          <a:prstGeom prst="bentConnector3">
-            <a:avLst/>
-          </a:prstGeom>
-          <a:ln w="28575">
-            <a:solidFill>
-              <a:schemeClr val="tx1"/>
-            </a:solidFill>
-          </a:ln>
-        </p:spPr>
-        <p:style>
-          <a:lnRef idx="1">
-            <a:schemeClr val="accent1"/>
-          </a:lnRef>
-          <a:fillRef idx="0">
-            <a:schemeClr val="accent1"/>
-          </a:fillRef>
-          <a:effectRef idx="0">
-            <a:schemeClr val="accent1"/>
-          </a:effectRef>
-          <a:fontRef idx="minor">
-            <a:schemeClr val="tx1"/>
-          </a:fontRef>
-        </p:style>
-      </p:cxnSp>
-      <p:cxnSp>
-        <p:nvCxnSpPr>
-          <p:cNvPr id="29" name="직선 연결선 28">
-            <a:extLst>
-              <a:ext uri="{FF2B5EF4-FFF2-40B4-BE49-F238E27FC236}">
-                <a16:creationId xmlns:a16="http://schemas.microsoft.com/office/drawing/2014/main" id="{78FFA10E-C2EA-439F-88E4-992AC68F7DC3}"/>
-              </a:ext>
-            </a:extLst>
-          </p:cNvPr>
-          <p:cNvCxnSpPr>
-            <a:cxnSpLocks/>
-          </p:cNvCxnSpPr>
-          <p:nvPr/>
-        </p:nvCxnSpPr>
-        <p:spPr>
-          <a:xfrm>
-            <a:off x="5223427" y="6899657"/>
-            <a:ext cx="1250263" cy="0"/>
-          </a:xfrm>
-          <a:prstGeom prst="line">
-            <a:avLst/>
-          </a:prstGeom>
-          <a:ln w="38100">
-            <a:solidFill>
-              <a:srgbClr val="FF0000"/>
-            </a:solidFill>
-          </a:ln>
-        </p:spPr>
-        <p:style>
-          <a:lnRef idx="1">
-            <a:schemeClr val="accent1"/>
-          </a:lnRef>
-          <a:fillRef idx="0">
-            <a:schemeClr val="accent1"/>
-          </a:fillRef>
-          <a:effectRef idx="0">
-            <a:schemeClr val="accent1"/>
-          </a:effectRef>
-          <a:fontRef idx="minor">
-            <a:schemeClr val="tx1"/>
-          </a:fontRef>
-        </p:style>
-      </p:cxnSp>
-      <p:cxnSp>
-        <p:nvCxnSpPr>
-          <p:cNvPr id="30" name="연결선: 꺾임 29">
-            <a:extLst>
-              <a:ext uri="{FF2B5EF4-FFF2-40B4-BE49-F238E27FC236}">
-                <a16:creationId xmlns:a16="http://schemas.microsoft.com/office/drawing/2014/main" id="{F77F7D78-5AAF-49DC-B7B0-DA0969BE0A7D}"/>
-              </a:ext>
-            </a:extLst>
-          </p:cNvPr>
-          <p:cNvCxnSpPr>
-            <a:cxnSpLocks/>
-          </p:cNvCxnSpPr>
-          <p:nvPr/>
-        </p:nvCxnSpPr>
-        <p:spPr>
-          <a:xfrm rot="5400000">
-            <a:off x="2029055" y="3963364"/>
-            <a:ext cx="415883" cy="3129093"/>
-          </a:xfrm>
-          <a:prstGeom prst="bentConnector3">
-            <a:avLst/>
-          </a:prstGeom>
-          <a:ln w="25400">
-            <a:solidFill>
-              <a:schemeClr val="accent2">
-                <a:lumMod val="40000"/>
-                <a:lumOff val="60000"/>
-              </a:schemeClr>
-            </a:solidFill>
-            <a:prstDash val="sysDash"/>
-          </a:ln>
-        </p:spPr>
-        <p:style>
-          <a:lnRef idx="1">
-            <a:schemeClr val="accent1"/>
-          </a:lnRef>
-          <a:fillRef idx="0">
-            <a:schemeClr val="accent1"/>
-          </a:fillRef>
-          <a:effectRef idx="0">
-            <a:schemeClr val="accent1"/>
-          </a:effectRef>
-          <a:fontRef idx="minor">
-            <a:schemeClr val="tx1"/>
-          </a:fontRef>
-        </p:style>
-      </p:cxnSp>
-      <p:sp>
-        <p:nvSpPr>
-          <p:cNvPr id="31" name="TextBox 30">
-            <a:extLst>
-              <a:ext uri="{FF2B5EF4-FFF2-40B4-BE49-F238E27FC236}">
-                <a16:creationId xmlns:a16="http://schemas.microsoft.com/office/drawing/2014/main" id="{B215DC81-69C0-4F74-814A-11AF48C99A35}"/>
-              </a:ext>
-            </a:extLst>
-          </p:cNvPr>
-          <p:cNvSpPr txBox="1"/>
-          <p:nvPr/>
-        </p:nvSpPr>
-        <p:spPr>
-          <a:xfrm>
-            <a:off x="945075" y="4945023"/>
-            <a:ext cx="1090000" cy="215444"/>
-          </a:xfrm>
-          <a:prstGeom prst="rect">
-            <a:avLst/>
-          </a:prstGeom>
-          <a:noFill/>
-        </p:spPr>
-        <p:txBody>
-          <a:bodyPr wrap="square" rtlCol="0">
-            <a:spAutoFit/>
-          </a:bodyPr>
-          <a:lstStyle/>
-          <a:p>
-            <a:pPr algn="ctr"/>
-            <a:r>
-              <a:rPr lang="en-US" altLang="ko-KR" sz="800" dirty="0"/>
-              <a:t>On/Off control</a:t>
-            </a:r>
-            <a:endParaRPr lang="ko-KR" altLang="en-US" sz="800" dirty="0"/>
-          </a:p>
-        </p:txBody>
-      </p:sp>
-      <p:cxnSp>
-        <p:nvCxnSpPr>
-          <p:cNvPr id="33" name="연결선: 꺾임 32">
-            <a:extLst>
-              <a:ext uri="{FF2B5EF4-FFF2-40B4-BE49-F238E27FC236}">
-                <a16:creationId xmlns:a16="http://schemas.microsoft.com/office/drawing/2014/main" id="{276B28D3-6D03-447C-BD23-006D248E45BD}"/>
-              </a:ext>
-            </a:extLst>
-          </p:cNvPr>
-          <p:cNvCxnSpPr>
-            <a:cxnSpLocks/>
-          </p:cNvCxnSpPr>
-          <p:nvPr/>
-        </p:nvCxnSpPr>
-        <p:spPr>
-          <a:xfrm rot="5400000" flipH="1" flipV="1">
-            <a:off x="1609673" y="3555482"/>
-            <a:ext cx="12700" cy="2844782"/>
-          </a:xfrm>
-          <a:prstGeom prst="bentConnector3">
-            <a:avLst>
-              <a:gd name="adj1" fmla="val 1800000"/>
-            </a:avLst>
-          </a:prstGeom>
-          <a:ln w="25400">
-            <a:solidFill>
-              <a:schemeClr val="accent2">
-                <a:lumMod val="40000"/>
-                <a:lumOff val="60000"/>
-              </a:schemeClr>
-            </a:solidFill>
-            <a:prstDash val="sysDash"/>
-          </a:ln>
-        </p:spPr>
-        <p:style>
-          <a:lnRef idx="1">
-            <a:schemeClr val="accent1"/>
-          </a:lnRef>
-          <a:fillRef idx="0">
-            <a:schemeClr val="accent1"/>
-          </a:fillRef>
-          <a:effectRef idx="0">
-            <a:schemeClr val="accent1"/>
-          </a:effectRef>
-          <a:fontRef idx="minor">
-            <a:schemeClr val="tx1"/>
-          </a:fontRef>
-        </p:style>
-      </p:cxnSp>
-      <p:sp>
-        <p:nvSpPr>
-          <p:cNvPr id="35" name="직사각형 34">
-            <a:extLst>
-              <a:ext uri="{FF2B5EF4-FFF2-40B4-BE49-F238E27FC236}">
-                <a16:creationId xmlns:a16="http://schemas.microsoft.com/office/drawing/2014/main" id="{BD70312A-C8BA-4A81-AF2F-D9CF5B10759C}"/>
+              <a:rPr lang="en-US" altLang="ko-KR" sz="900" dirty="0"/>
+              <a:t>CODEC</a:t>
+            </a:r>
+          </a:p>
+        </p:txBody>
+      </p:sp>
+      <p:sp>
+        <p:nvSpPr>
+          <p:cNvPr id="56" name="사각형: 둥근 모서리 55">
+            <a:extLst>
+              <a:ext uri="{FF2B5EF4-FFF2-40B4-BE49-F238E27FC236}">
+                <a16:creationId xmlns:a16="http://schemas.microsoft.com/office/drawing/2014/main" id="{1C1B9D07-5DC8-49CB-911B-98C5CFBAE088}"/>
               </a:ext>
             </a:extLst>
           </p:cNvPr>
@@ -9291,10 +8760,10 @@
         </p:nvSpPr>
         <p:spPr>
           <a:xfrm>
-            <a:off x="9500439" y="2336480"/>
-            <a:ext cx="2106843" cy="612000"/>
-          </a:xfrm>
-          <a:prstGeom prst="rect">
+            <a:off x="4468510" y="5289700"/>
+            <a:ext cx="637954" cy="627321"/>
+          </a:xfrm>
+          <a:prstGeom prst="roundRect">
             <a:avLst/>
           </a:prstGeom>
         </p:spPr>
@@ -9320,19 +8789,18 @@
           <a:p>
             <a:pPr algn="ctr"/>
             <a:r>
-              <a:rPr lang="en-US" altLang="ko-KR" dirty="0"/>
-              <a:t>LED</a:t>
-            </a:r>
-            <a:endParaRPr lang="ko-KR" altLang="en-US" dirty="0"/>
-          </a:p>
-        </p:txBody>
-      </p:sp>
-      <p:sp>
-        <p:nvSpPr>
-          <p:cNvPr id="36" name="직사각형 35">
-            <a:extLst>
-              <a:ext uri="{FF2B5EF4-FFF2-40B4-BE49-F238E27FC236}">
-                <a16:creationId xmlns:a16="http://schemas.microsoft.com/office/drawing/2014/main" id="{7763D792-150E-451D-8C98-535D55678D36}"/>
+              <a:rPr lang="en-US" altLang="ko-KR" sz="900" dirty="0"/>
+              <a:t>SD</a:t>
+            </a:r>
+          </a:p>
+        </p:txBody>
+      </p:sp>
+      <p:sp>
+        <p:nvSpPr>
+          <p:cNvPr id="57" name="사각형: 둥근 모서리 56">
+            <a:extLst>
+              <a:ext uri="{FF2B5EF4-FFF2-40B4-BE49-F238E27FC236}">
+                <a16:creationId xmlns:a16="http://schemas.microsoft.com/office/drawing/2014/main" id="{73578F03-3C47-4491-9EC8-AD2F7016762F}"/>
               </a:ext>
             </a:extLst>
           </p:cNvPr>
@@ -9341,10 +8809,10 @@
         </p:nvSpPr>
         <p:spPr>
           <a:xfrm>
-            <a:off x="9500439" y="3126336"/>
-            <a:ext cx="2106843" cy="612000"/>
-          </a:xfrm>
-          <a:prstGeom prst="rect">
+            <a:off x="6843823" y="3115338"/>
+            <a:ext cx="637954" cy="627321"/>
+          </a:xfrm>
+          <a:prstGeom prst="roundRect">
             <a:avLst/>
           </a:prstGeom>
         </p:spPr>
@@ -9370,202 +8838,18 @@
           <a:p>
             <a:pPr algn="ctr"/>
             <a:r>
-              <a:rPr lang="en-US" altLang="ko-KR" dirty="0"/>
-              <a:t>BAT Sense</a:t>
-            </a:r>
-            <a:endParaRPr lang="ko-KR" altLang="en-US" dirty="0"/>
-          </a:p>
-        </p:txBody>
-      </p:sp>
-      <p:cxnSp>
-        <p:nvCxnSpPr>
-          <p:cNvPr id="37" name="연결선: 꺾임 36">
-            <a:extLst>
-              <a:ext uri="{FF2B5EF4-FFF2-40B4-BE49-F238E27FC236}">
-                <a16:creationId xmlns:a16="http://schemas.microsoft.com/office/drawing/2014/main" id="{EC7CF4EF-4D0D-479A-8023-5A02A5A5AF6F}"/>
-              </a:ext>
-            </a:extLst>
-          </p:cNvPr>
-          <p:cNvCxnSpPr>
-            <a:cxnSpLocks/>
-          </p:cNvCxnSpPr>
-          <p:nvPr/>
-        </p:nvCxnSpPr>
-        <p:spPr>
-          <a:xfrm rot="10800000">
-            <a:off x="5772154" y="5378282"/>
-            <a:ext cx="2456170" cy="1080058"/>
-          </a:xfrm>
-          <a:prstGeom prst="bentConnector3">
-            <a:avLst>
-              <a:gd name="adj1" fmla="val 50000"/>
-            </a:avLst>
-          </a:prstGeom>
-          <a:ln>
-            <a:solidFill>
-              <a:schemeClr val="accent2">
-                <a:lumMod val="75000"/>
-              </a:schemeClr>
-            </a:solidFill>
-            <a:prstDash val="sysDash"/>
-          </a:ln>
-        </p:spPr>
-        <p:style>
-          <a:lnRef idx="1">
-            <a:schemeClr val="accent1"/>
-          </a:lnRef>
-          <a:fillRef idx="0">
-            <a:schemeClr val="accent1"/>
-          </a:fillRef>
-          <a:effectRef idx="0">
-            <a:schemeClr val="accent1"/>
-          </a:effectRef>
-          <a:fontRef idx="minor">
-            <a:schemeClr val="tx1"/>
-          </a:fontRef>
-        </p:style>
-      </p:cxnSp>
-      <p:cxnSp>
-        <p:nvCxnSpPr>
-          <p:cNvPr id="38" name="연결선: 꺾임 37">
-            <a:extLst>
-              <a:ext uri="{FF2B5EF4-FFF2-40B4-BE49-F238E27FC236}">
-                <a16:creationId xmlns:a16="http://schemas.microsoft.com/office/drawing/2014/main" id="{BDC1C56E-5438-4F4C-BCC2-6CA87672DCCB}"/>
-              </a:ext>
-            </a:extLst>
-          </p:cNvPr>
-          <p:cNvCxnSpPr>
-            <a:cxnSpLocks/>
-          </p:cNvCxnSpPr>
-          <p:nvPr/>
-        </p:nvCxnSpPr>
-        <p:spPr>
-          <a:xfrm>
-            <a:off x="3353734" y="5646651"/>
-            <a:ext cx="1595197" cy="773786"/>
-          </a:xfrm>
-          <a:prstGeom prst="bentConnector3">
-            <a:avLst>
-              <a:gd name="adj1" fmla="val 50000"/>
-            </a:avLst>
-          </a:prstGeom>
-          <a:ln w="28575">
-            <a:solidFill>
-              <a:schemeClr val="tx1"/>
-            </a:solidFill>
-          </a:ln>
-        </p:spPr>
-        <p:style>
-          <a:lnRef idx="1">
-            <a:schemeClr val="accent1"/>
-          </a:lnRef>
-          <a:fillRef idx="0">
-            <a:schemeClr val="accent1"/>
-          </a:fillRef>
-          <a:effectRef idx="0">
-            <a:schemeClr val="accent1"/>
-          </a:effectRef>
-          <a:fontRef idx="minor">
-            <a:schemeClr val="tx1"/>
-          </a:fontRef>
-        </p:style>
-      </p:cxnSp>
-      <p:cxnSp>
-        <p:nvCxnSpPr>
-          <p:cNvPr id="39" name="연결선: 꺾임 38">
-            <a:extLst>
-              <a:ext uri="{FF2B5EF4-FFF2-40B4-BE49-F238E27FC236}">
-                <a16:creationId xmlns:a16="http://schemas.microsoft.com/office/drawing/2014/main" id="{1F519340-73DD-4CA3-8952-F14935377654}"/>
-              </a:ext>
-            </a:extLst>
-          </p:cNvPr>
-          <p:cNvCxnSpPr>
-            <a:cxnSpLocks/>
-          </p:cNvCxnSpPr>
-          <p:nvPr/>
-        </p:nvCxnSpPr>
-        <p:spPr>
-          <a:xfrm>
-            <a:off x="4886719" y="6084173"/>
-            <a:ext cx="1250264" cy="336264"/>
-          </a:xfrm>
-          <a:prstGeom prst="bentConnector3">
-            <a:avLst>
-              <a:gd name="adj1" fmla="val 50000"/>
-            </a:avLst>
-          </a:prstGeom>
-          <a:ln w="28575">
-            <a:solidFill>
-              <a:schemeClr val="tx1"/>
-            </a:solidFill>
-          </a:ln>
-        </p:spPr>
-        <p:style>
-          <a:lnRef idx="1">
-            <a:schemeClr val="accent1"/>
-          </a:lnRef>
-          <a:fillRef idx="0">
-            <a:schemeClr val="accent1"/>
-          </a:fillRef>
-          <a:effectRef idx="0">
-            <a:schemeClr val="accent1"/>
-          </a:effectRef>
-          <a:fontRef idx="minor">
-            <a:schemeClr val="tx1"/>
-          </a:fontRef>
-        </p:style>
-      </p:cxnSp>
-      <p:cxnSp>
-        <p:nvCxnSpPr>
-          <p:cNvPr id="40" name="연결선: 꺾임 39">
-            <a:extLst>
-              <a:ext uri="{FF2B5EF4-FFF2-40B4-BE49-F238E27FC236}">
-                <a16:creationId xmlns:a16="http://schemas.microsoft.com/office/drawing/2014/main" id="{D6BE103D-32BC-463F-BAC6-F9AB59D943BC}"/>
-              </a:ext>
-            </a:extLst>
-          </p:cNvPr>
-          <p:cNvCxnSpPr>
-            <a:cxnSpLocks/>
-          </p:cNvCxnSpPr>
-          <p:nvPr/>
-        </p:nvCxnSpPr>
-        <p:spPr>
-          <a:xfrm flipV="1">
-            <a:off x="672450" y="5951336"/>
-            <a:ext cx="1249905" cy="328887"/>
-          </a:xfrm>
-          <a:prstGeom prst="bentConnector3">
-            <a:avLst>
-              <a:gd name="adj1" fmla="val 50000"/>
-            </a:avLst>
-          </a:prstGeom>
-          <a:ln w="28575">
-            <a:solidFill>
-              <a:schemeClr val="tx1"/>
-            </a:solidFill>
-          </a:ln>
-        </p:spPr>
-        <p:style>
-          <a:lnRef idx="1">
-            <a:schemeClr val="accent1"/>
-          </a:lnRef>
-          <a:fillRef idx="0">
-            <a:schemeClr val="accent1"/>
-          </a:fillRef>
-          <a:effectRef idx="0">
-            <a:schemeClr val="accent1"/>
-          </a:effectRef>
-          <a:fontRef idx="minor">
-            <a:schemeClr val="tx1"/>
-          </a:fontRef>
-        </p:style>
-      </p:cxnSp>
-      <p:sp>
-        <p:nvSpPr>
-          <p:cNvPr id="41" name="직사각형 40">
-            <a:extLst>
-              <a:ext uri="{FF2B5EF4-FFF2-40B4-BE49-F238E27FC236}">
-                <a16:creationId xmlns:a16="http://schemas.microsoft.com/office/drawing/2014/main" id="{C21F32D4-0668-4625-B322-273195D0F518}"/>
+              <a:rPr lang="en-US" altLang="ko-KR" sz="900" dirty="0"/>
+              <a:t>LEDx3</a:t>
+            </a:r>
+          </a:p>
+        </p:txBody>
+      </p:sp>
+      <p:sp>
+        <p:nvSpPr>
+          <p:cNvPr id="58" name="사각형: 둥근 모서리 57">
+            <a:extLst>
+              <a:ext uri="{FF2B5EF4-FFF2-40B4-BE49-F238E27FC236}">
+                <a16:creationId xmlns:a16="http://schemas.microsoft.com/office/drawing/2014/main" id="{A8E13F2F-47BF-4CCE-8D2A-F1AC852F7881}"/>
               </a:ext>
             </a:extLst>
           </p:cNvPr>
@@ -9574,10 +8858,10 @@
         </p:nvSpPr>
         <p:spPr>
           <a:xfrm>
-            <a:off x="2090069" y="3789136"/>
-            <a:ext cx="1046205" cy="610423"/>
-          </a:xfrm>
-          <a:prstGeom prst="rect">
+            <a:off x="6843823" y="2371059"/>
+            <a:ext cx="637954" cy="627321"/>
+          </a:xfrm>
+          <a:prstGeom prst="roundRect">
             <a:avLst/>
           </a:prstGeom>
         </p:spPr>
@@ -9603,19 +8887,18 @@
           <a:p>
             <a:pPr algn="ctr"/>
             <a:r>
-              <a:rPr lang="en-US" altLang="ko-KR" dirty="0"/>
-              <a:t>Charger</a:t>
-            </a:r>
-            <a:endParaRPr lang="ko-KR" altLang="en-US" dirty="0"/>
-          </a:p>
-        </p:txBody>
-      </p:sp>
-      <p:sp>
-        <p:nvSpPr>
-          <p:cNvPr id="42" name="직사각형 41">
-            <a:extLst>
-              <a:ext uri="{FF2B5EF4-FFF2-40B4-BE49-F238E27FC236}">
-                <a16:creationId xmlns:a16="http://schemas.microsoft.com/office/drawing/2014/main" id="{C9586E65-0A36-432F-BE39-DEF9DD6C16AD}"/>
+              <a:rPr lang="en-US" altLang="ko-KR" sz="900" dirty="0"/>
+              <a:t>BTNx8</a:t>
+            </a:r>
+          </a:p>
+        </p:txBody>
+      </p:sp>
+      <p:sp>
+        <p:nvSpPr>
+          <p:cNvPr id="59" name="사각형: 둥근 모서리 58">
+            <a:extLst>
+              <a:ext uri="{FF2B5EF4-FFF2-40B4-BE49-F238E27FC236}">
+                <a16:creationId xmlns:a16="http://schemas.microsoft.com/office/drawing/2014/main" id="{30FB9A6A-A11C-4684-B81E-0187066477AC}"/>
               </a:ext>
             </a:extLst>
           </p:cNvPr>
@@ -9624,10 +8907,10 @@
         </p:nvSpPr>
         <p:spPr>
           <a:xfrm>
-            <a:off x="608368" y="3782786"/>
-            <a:ext cx="1046205" cy="610423"/>
-          </a:xfrm>
-          <a:prstGeom prst="rect">
+            <a:off x="4882116" y="1626780"/>
+            <a:ext cx="637954" cy="627321"/>
+          </a:xfrm>
+          <a:prstGeom prst="roundRect">
             <a:avLst/>
           </a:prstGeom>
         </p:spPr>
@@ -9653,121 +8936,19 @@
           <a:p>
             <a:pPr algn="ctr"/>
             <a:r>
-              <a:rPr lang="en-US" altLang="ko-KR" dirty="0"/>
-              <a:t>External</a:t>
-            </a:r>
-          </a:p>
-          <a:p>
-            <a:pPr algn="ctr"/>
-            <a:r>
-              <a:rPr lang="en-US" altLang="ko-KR" dirty="0"/>
-              <a:t>Power</a:t>
-            </a:r>
-          </a:p>
-          <a:p>
-            <a:pPr algn="ctr"/>
-            <a:r>
-              <a:rPr lang="en-US" altLang="ko-KR" dirty="0"/>
-              <a:t>(USB)</a:t>
-            </a:r>
-            <a:endParaRPr lang="ko-KR" altLang="en-US" dirty="0"/>
-          </a:p>
-        </p:txBody>
-      </p:sp>
-      <p:cxnSp>
-        <p:nvCxnSpPr>
-          <p:cNvPr id="43" name="직선 연결선 42">
-            <a:extLst>
-              <a:ext uri="{FF2B5EF4-FFF2-40B4-BE49-F238E27FC236}">
-                <a16:creationId xmlns:a16="http://schemas.microsoft.com/office/drawing/2014/main" id="{B827F601-2C56-4EE0-9F9E-2934BAFD5B58}"/>
-              </a:ext>
-            </a:extLst>
-          </p:cNvPr>
-          <p:cNvCxnSpPr>
-            <a:cxnSpLocks/>
-          </p:cNvCxnSpPr>
-          <p:nvPr/>
-        </p:nvCxnSpPr>
-        <p:spPr>
-          <a:xfrm flipV="1">
-            <a:off x="2893384" y="6555434"/>
-            <a:ext cx="485779" cy="6350"/>
-          </a:xfrm>
-          <a:prstGeom prst="line">
-            <a:avLst/>
-          </a:prstGeom>
-          <a:ln w="38100">
-            <a:solidFill>
-              <a:schemeClr val="tx1"/>
-            </a:solidFill>
-          </a:ln>
-        </p:spPr>
-        <p:style>
-          <a:lnRef idx="1">
-            <a:schemeClr val="accent1"/>
-          </a:lnRef>
-          <a:fillRef idx="0">
-            <a:schemeClr val="accent1"/>
-          </a:fillRef>
-          <a:effectRef idx="0">
-            <a:schemeClr val="accent1"/>
-          </a:effectRef>
-          <a:fontRef idx="minor">
-            <a:schemeClr val="tx1"/>
-          </a:fontRef>
-        </p:style>
-      </p:cxnSp>
-      <p:cxnSp>
-        <p:nvCxnSpPr>
-          <p:cNvPr id="44" name="직선 연결선 43">
-            <a:extLst>
-              <a:ext uri="{FF2B5EF4-FFF2-40B4-BE49-F238E27FC236}">
-                <a16:creationId xmlns:a16="http://schemas.microsoft.com/office/drawing/2014/main" id="{EA53BD56-071D-4DB3-A3F5-F1EE5ABCF873}"/>
-              </a:ext>
-            </a:extLst>
-          </p:cNvPr>
-          <p:cNvCxnSpPr>
-            <a:cxnSpLocks/>
-          </p:cNvCxnSpPr>
-          <p:nvPr/>
-        </p:nvCxnSpPr>
-        <p:spPr>
-          <a:xfrm>
-            <a:off x="1785202" y="6241385"/>
-            <a:ext cx="435496" cy="6350"/>
-          </a:xfrm>
-          <a:prstGeom prst="line">
-            <a:avLst/>
-          </a:prstGeom>
-          <a:ln w="38100">
-            <a:solidFill>
-              <a:schemeClr val="accent6">
-                <a:lumMod val="75000"/>
-              </a:schemeClr>
-            </a:solidFill>
-          </a:ln>
-        </p:spPr>
-        <p:style>
-          <a:lnRef idx="1">
-            <a:schemeClr val="accent1"/>
-          </a:lnRef>
-          <a:fillRef idx="0">
-            <a:schemeClr val="accent1"/>
-          </a:fillRef>
-          <a:effectRef idx="0">
-            <a:schemeClr val="accent1"/>
-          </a:effectRef>
-          <a:fontRef idx="minor">
-            <a:schemeClr val="tx1"/>
-          </a:fontRef>
-        </p:style>
-      </p:cxnSp>
-      <p:sp>
-        <p:nvSpPr>
-          <p:cNvPr id="50" name="사각형: 둥근 모서리 49">
-            <a:extLst>
-              <a:ext uri="{FF2B5EF4-FFF2-40B4-BE49-F238E27FC236}">
-                <a16:creationId xmlns:a16="http://schemas.microsoft.com/office/drawing/2014/main" id="{49A8F332-6426-4F33-8ABB-381122ED1425}"/>
+              <a:rPr lang="en-US" altLang="ko-KR" sz="900" dirty="0"/>
+              <a:t>MCU</a:t>
+            </a:r>
+            <a:endParaRPr lang="ko-KR" altLang="en-US" sz="900" dirty="0"/>
+          </a:p>
+        </p:txBody>
+      </p:sp>
+      <p:sp>
+        <p:nvSpPr>
+          <p:cNvPr id="60" name="사각형: 둥근 모서리 59">
+            <a:extLst>
+              <a:ext uri="{FF2B5EF4-FFF2-40B4-BE49-F238E27FC236}">
+                <a16:creationId xmlns:a16="http://schemas.microsoft.com/office/drawing/2014/main" id="{81ABB9E1-9CC5-4AD0-9D48-F8403BC14D5A}"/>
               </a:ext>
             </a:extLst>
           </p:cNvPr>
@@ -9776,8 +8957,8 @@
         </p:nvSpPr>
         <p:spPr>
           <a:xfrm>
-            <a:off x="193632" y="756768"/>
-            <a:ext cx="1252613" cy="525760"/>
+            <a:off x="3919870" y="3115338"/>
+            <a:ext cx="637954" cy="627321"/>
           </a:xfrm>
           <a:prstGeom prst="roundRect">
             <a:avLst/>
@@ -9805,213 +8986,461 @@
           <a:p>
             <a:pPr algn="ctr"/>
             <a:r>
-              <a:rPr lang="en-US" altLang="ko-KR" dirty="0"/>
-              <a:t>HDMI</a:t>
-            </a:r>
-            <a:endParaRPr lang="ko-KR" altLang="en-US" dirty="0"/>
-          </a:p>
-        </p:txBody>
-      </p:sp>
-      <p:sp>
-        <p:nvSpPr>
-          <p:cNvPr id="51" name="사각형: 둥근 모서리 50">
-            <a:extLst>
-              <a:ext uri="{FF2B5EF4-FFF2-40B4-BE49-F238E27FC236}">
-                <a16:creationId xmlns:a16="http://schemas.microsoft.com/office/drawing/2014/main" id="{2E512C49-CDFF-4CF6-9550-FD28B4DC0086}"/>
-              </a:ext>
-            </a:extLst>
-          </p:cNvPr>
-          <p:cNvSpPr/>
-          <p:nvPr/>
-        </p:nvSpPr>
-        <p:spPr>
-          <a:xfrm>
-            <a:off x="212549" y="1493368"/>
-            <a:ext cx="1252613" cy="525760"/>
-          </a:xfrm>
-          <a:prstGeom prst="roundRect">
+              <a:rPr lang="en-US" altLang="ko-KR" sz="900" dirty="0"/>
+              <a:t>MUL</a:t>
+            </a:r>
+            <a:endParaRPr lang="ko-KR" altLang="en-US" sz="900" dirty="0"/>
+          </a:p>
+        </p:txBody>
+      </p:sp>
+      <p:cxnSp>
+        <p:nvCxnSpPr>
+          <p:cNvPr id="9" name="연결선: 꺾임 8">
+            <a:extLst>
+              <a:ext uri="{FF2B5EF4-FFF2-40B4-BE49-F238E27FC236}">
+                <a16:creationId xmlns:a16="http://schemas.microsoft.com/office/drawing/2014/main" id="{9E7226E4-423D-458C-BA61-EB9CF545B9AC}"/>
+              </a:ext>
+            </a:extLst>
+          </p:cNvPr>
+          <p:cNvCxnSpPr>
+            <a:stCxn id="2" idx="3"/>
+            <a:endCxn id="56" idx="0"/>
+          </p:cNvCxnSpPr>
+          <p:nvPr/>
+        </p:nvCxnSpPr>
+        <p:spPr>
+          <a:xfrm>
+            <a:off x="2732567" y="4714655"/>
+            <a:ext cx="2054920" cy="575045"/>
+          </a:xfrm>
+          <a:prstGeom prst="bentConnector2">
+            <a:avLst/>
+          </a:prstGeom>
+        </p:spPr>
+        <p:style>
+          <a:lnRef idx="1">
+            <a:schemeClr val="accent1"/>
+          </a:lnRef>
+          <a:fillRef idx="0">
+            <a:schemeClr val="accent1"/>
+          </a:fillRef>
+          <a:effectRef idx="0">
+            <a:schemeClr val="accent1"/>
+          </a:effectRef>
+          <a:fontRef idx="minor">
+            <a:schemeClr val="tx1"/>
+          </a:fontRef>
+        </p:style>
+      </p:cxnSp>
+      <p:cxnSp>
+        <p:nvCxnSpPr>
+          <p:cNvPr id="16" name="연결선: 꺾임 15">
+            <a:extLst>
+              <a:ext uri="{FF2B5EF4-FFF2-40B4-BE49-F238E27FC236}">
+                <a16:creationId xmlns:a16="http://schemas.microsoft.com/office/drawing/2014/main" id="{1F557A82-EE31-4E67-988A-0FD60766CEA2}"/>
+              </a:ext>
+            </a:extLst>
+          </p:cNvPr>
+          <p:cNvCxnSpPr>
+            <a:stCxn id="2" idx="0"/>
+            <a:endCxn id="59" idx="1"/>
+          </p:cNvCxnSpPr>
+          <p:nvPr/>
+        </p:nvCxnSpPr>
+        <p:spPr>
+          <a:xfrm rot="5400000" flipH="1" flipV="1">
+            <a:off x="2417577" y="1936455"/>
+            <a:ext cx="2460553" cy="2468526"/>
+          </a:xfrm>
+          <a:prstGeom prst="bentConnector2">
+            <a:avLst/>
+          </a:prstGeom>
+          <a:ln w="9525" cap="flat" cmpd="sng" algn="ctr">
+            <a:solidFill>
+              <a:schemeClr val="accent2"/>
+            </a:solidFill>
+            <a:prstDash val="dash"/>
+            <a:round/>
+            <a:headEnd type="none" w="med" len="med"/>
+            <a:tailEnd type="none" w="med" len="med"/>
+          </a:ln>
+        </p:spPr>
+        <p:style>
+          <a:lnRef idx="0">
+            <a:scrgbClr r="0" g="0" b="0"/>
+          </a:lnRef>
+          <a:fillRef idx="0">
+            <a:scrgbClr r="0" g="0" b="0"/>
+          </a:fillRef>
+          <a:effectRef idx="0">
+            <a:scrgbClr r="0" g="0" b="0"/>
+          </a:effectRef>
+          <a:fontRef idx="minor">
+            <a:schemeClr val="tx1"/>
+          </a:fontRef>
+        </p:style>
+      </p:cxnSp>
+      <p:cxnSp>
+        <p:nvCxnSpPr>
+          <p:cNvPr id="34" name="연결선: 꺾임 33">
+            <a:extLst>
+              <a:ext uri="{FF2B5EF4-FFF2-40B4-BE49-F238E27FC236}">
+                <a16:creationId xmlns:a16="http://schemas.microsoft.com/office/drawing/2014/main" id="{35201270-FBEB-4558-8644-0EE44C3FA52E}"/>
+              </a:ext>
+            </a:extLst>
+          </p:cNvPr>
+          <p:cNvCxnSpPr>
+            <a:stCxn id="60" idx="3"/>
+          </p:cNvCxnSpPr>
+          <p:nvPr/>
+        </p:nvCxnSpPr>
+        <p:spPr>
+          <a:xfrm>
+            <a:off x="4557824" y="3428999"/>
+            <a:ext cx="324292" cy="1"/>
+          </a:xfrm>
+          <a:prstGeom prst="bentConnector3">
             <a:avLst/>
           </a:prstGeom>
         </p:spPr>
         <p:style>
           <a:lnRef idx="2">
-            <a:schemeClr val="accent1">
-              <a:shade val="50000"/>
-            </a:schemeClr>
-          </a:lnRef>
-          <a:fillRef idx="1">
-            <a:schemeClr val="accent1"/>
-          </a:fillRef>
-          <a:effectRef idx="0">
-            <a:schemeClr val="accent1"/>
-          </a:effectRef>
-          <a:fontRef idx="minor">
-            <a:schemeClr val="lt1"/>
-          </a:fontRef>
-        </p:style>
-        <p:txBody>
-          <a:bodyPr rtlCol="0" anchor="ctr"/>
-          <a:lstStyle/>
-          <a:p>
-            <a:pPr algn="ctr"/>
-            <a:r>
-              <a:rPr lang="en-US" altLang="ko-KR" dirty="0"/>
-              <a:t>USB-OTG</a:t>
-            </a:r>
-            <a:endParaRPr lang="ko-KR" altLang="en-US" dirty="0"/>
-          </a:p>
-        </p:txBody>
-      </p:sp>
-      <p:sp>
-        <p:nvSpPr>
-          <p:cNvPr id="52" name="사각형: 둥근 모서리 51">
-            <a:extLst>
-              <a:ext uri="{FF2B5EF4-FFF2-40B4-BE49-F238E27FC236}">
-                <a16:creationId xmlns:a16="http://schemas.microsoft.com/office/drawing/2014/main" id="{E02B16F7-A9C3-42B9-849F-3D6758BA7588}"/>
-              </a:ext>
-            </a:extLst>
-          </p:cNvPr>
-          <p:cNvSpPr/>
-          <p:nvPr/>
-        </p:nvSpPr>
-        <p:spPr>
-          <a:xfrm>
-            <a:off x="193632" y="2642480"/>
-            <a:ext cx="1355250" cy="561992"/>
-          </a:xfrm>
-          <a:prstGeom prst="roundRect">
+            <a:schemeClr val="dk1"/>
+          </a:lnRef>
+          <a:fillRef idx="0">
+            <a:schemeClr val="dk1"/>
+          </a:fillRef>
+          <a:effectRef idx="1">
+            <a:schemeClr val="dk1"/>
+          </a:effectRef>
+          <a:fontRef idx="minor">
+            <a:schemeClr val="tx1"/>
+          </a:fontRef>
+        </p:style>
+      </p:cxnSp>
+      <p:cxnSp>
+        <p:nvCxnSpPr>
+          <p:cNvPr id="64" name="연결선: 꺾임 63">
+            <a:extLst>
+              <a:ext uri="{FF2B5EF4-FFF2-40B4-BE49-F238E27FC236}">
+                <a16:creationId xmlns:a16="http://schemas.microsoft.com/office/drawing/2014/main" id="{B1F8B939-FCE9-4C3A-8323-D9929248BBAB}"/>
+              </a:ext>
+            </a:extLst>
+          </p:cNvPr>
+          <p:cNvCxnSpPr>
+            <a:cxnSpLocks/>
+          </p:cNvCxnSpPr>
+          <p:nvPr/>
+        </p:nvCxnSpPr>
+        <p:spPr>
+          <a:xfrm rot="5400000">
+            <a:off x="4289352" y="2203597"/>
+            <a:ext cx="861237" cy="962246"/>
+          </a:xfrm>
+          <a:prstGeom prst="bentConnector3">
             <a:avLst/>
           </a:prstGeom>
         </p:spPr>
         <p:style>
           <a:lnRef idx="2">
-            <a:schemeClr val="accent1">
-              <a:shade val="50000"/>
-            </a:schemeClr>
-          </a:lnRef>
-          <a:fillRef idx="1">
-            <a:schemeClr val="accent1"/>
-          </a:fillRef>
-          <a:effectRef idx="0">
-            <a:schemeClr val="accent1"/>
-          </a:effectRef>
-          <a:fontRef idx="minor">
-            <a:schemeClr val="lt1"/>
-          </a:fontRef>
-        </p:style>
-        <p:txBody>
-          <a:bodyPr rtlCol="0" anchor="ctr"/>
-          <a:lstStyle/>
-          <a:p>
-            <a:pPr algn="ctr"/>
-            <a:r>
-              <a:rPr lang="en-US" altLang="ko-KR" dirty="0"/>
-              <a:t>USB-PWR</a:t>
-            </a:r>
-            <a:endParaRPr lang="ko-KR" altLang="en-US" dirty="0"/>
-          </a:p>
-        </p:txBody>
-      </p:sp>
-      <p:sp>
-        <p:nvSpPr>
-          <p:cNvPr id="53" name="사각형: 둥근 모서리 52">
-            <a:extLst>
-              <a:ext uri="{FF2B5EF4-FFF2-40B4-BE49-F238E27FC236}">
-                <a16:creationId xmlns:a16="http://schemas.microsoft.com/office/drawing/2014/main" id="{6AB375C4-9A20-4A14-8B84-7BC6D5ACE332}"/>
-              </a:ext>
-            </a:extLst>
-          </p:cNvPr>
-          <p:cNvSpPr/>
-          <p:nvPr/>
-        </p:nvSpPr>
-        <p:spPr>
-          <a:xfrm>
-            <a:off x="9573208" y="5646651"/>
-            <a:ext cx="1558212" cy="522828"/>
-          </a:xfrm>
-          <a:prstGeom prst="roundRect">
+            <a:schemeClr val="dk1"/>
+          </a:lnRef>
+          <a:fillRef idx="0">
+            <a:schemeClr val="dk1"/>
+          </a:fillRef>
+          <a:effectRef idx="1">
+            <a:schemeClr val="dk1"/>
+          </a:effectRef>
+          <a:fontRef idx="minor">
+            <a:schemeClr val="tx1"/>
+          </a:fontRef>
+        </p:style>
+      </p:cxnSp>
+      <p:cxnSp>
+        <p:nvCxnSpPr>
+          <p:cNvPr id="66" name="연결선: 꺾임 65">
+            <a:extLst>
+              <a:ext uri="{FF2B5EF4-FFF2-40B4-BE49-F238E27FC236}">
+                <a16:creationId xmlns:a16="http://schemas.microsoft.com/office/drawing/2014/main" id="{E5F3313B-37BD-4601-8F70-0CFB6D265BBD}"/>
+              </a:ext>
+            </a:extLst>
+          </p:cNvPr>
+          <p:cNvCxnSpPr>
+            <a:stCxn id="2" idx="0"/>
+            <a:endCxn id="60" idx="1"/>
+          </p:cNvCxnSpPr>
+          <p:nvPr/>
+        </p:nvCxnSpPr>
+        <p:spPr>
+          <a:xfrm rot="5400000" flipH="1" flipV="1">
+            <a:off x="2680733" y="3161857"/>
+            <a:ext cx="971995" cy="1506280"/>
+          </a:xfrm>
+          <a:prstGeom prst="bentConnector2">
             <a:avLst/>
           </a:prstGeom>
         </p:spPr>
         <p:style>
           <a:lnRef idx="2">
-            <a:schemeClr val="accent1">
-              <a:shade val="50000"/>
-            </a:schemeClr>
-          </a:lnRef>
-          <a:fillRef idx="1">
-            <a:schemeClr val="accent1"/>
-          </a:fillRef>
-          <a:effectRef idx="0">
-            <a:schemeClr val="accent1"/>
-          </a:effectRef>
-          <a:fontRef idx="minor">
-            <a:schemeClr val="lt1"/>
-          </a:fontRef>
-        </p:style>
-        <p:txBody>
-          <a:bodyPr rtlCol="0" anchor="ctr"/>
-          <a:lstStyle/>
-          <a:p>
-            <a:pPr algn="ctr"/>
-            <a:r>
-              <a:rPr lang="en-US" altLang="ko-KR" dirty="0"/>
-              <a:t>Key 1 ~ 5</a:t>
-            </a:r>
-            <a:endParaRPr lang="ko-KR" altLang="en-US" dirty="0"/>
-          </a:p>
-        </p:txBody>
-      </p:sp>
-      <p:sp>
-        <p:nvSpPr>
-          <p:cNvPr id="54" name="사각형: 둥근 모서리 53">
-            <a:extLst>
-              <a:ext uri="{FF2B5EF4-FFF2-40B4-BE49-F238E27FC236}">
-                <a16:creationId xmlns:a16="http://schemas.microsoft.com/office/drawing/2014/main" id="{A2399806-1820-49EB-9D34-582A3C628484}"/>
-              </a:ext>
-            </a:extLst>
-          </p:cNvPr>
-          <p:cNvSpPr/>
-          <p:nvPr/>
-        </p:nvSpPr>
-        <p:spPr>
-          <a:xfrm>
-            <a:off x="9573208" y="6221687"/>
-            <a:ext cx="1558212" cy="522828"/>
-          </a:xfrm>
-          <a:prstGeom prst="roundRect">
-            <a:avLst/>
-          </a:prstGeom>
-        </p:spPr>
-        <p:style>
-          <a:lnRef idx="2">
-            <a:schemeClr val="accent1">
-              <a:shade val="50000"/>
-            </a:schemeClr>
-          </a:lnRef>
-          <a:fillRef idx="1">
-            <a:schemeClr val="accent1"/>
-          </a:fillRef>
-          <a:effectRef idx="0">
-            <a:schemeClr val="accent1"/>
-          </a:effectRef>
-          <a:fontRef idx="minor">
-            <a:schemeClr val="lt1"/>
-          </a:fontRef>
-        </p:style>
-        <p:txBody>
-          <a:bodyPr rtlCol="0" anchor="ctr"/>
-          <a:lstStyle/>
-          <a:p>
-            <a:pPr algn="ctr"/>
-            <a:r>
-              <a:rPr lang="en-US" altLang="ko-KR" dirty="0"/>
-              <a:t>Power Key</a:t>
-            </a:r>
-            <a:endParaRPr lang="ko-KR" altLang="en-US" dirty="0"/>
-          </a:p>
-        </p:txBody>
-      </p:sp>
+            <a:schemeClr val="dk1"/>
+          </a:lnRef>
+          <a:fillRef idx="0">
+            <a:schemeClr val="dk1"/>
+          </a:fillRef>
+          <a:effectRef idx="1">
+            <a:schemeClr val="dk1"/>
+          </a:effectRef>
+          <a:fontRef idx="minor">
+            <a:schemeClr val="tx1"/>
+          </a:fontRef>
+        </p:style>
+      </p:cxnSp>
+      <p:cxnSp>
+        <p:nvCxnSpPr>
+          <p:cNvPr id="68" name="연결선: 꺾임 67">
+            <a:extLst>
+              <a:ext uri="{FF2B5EF4-FFF2-40B4-BE49-F238E27FC236}">
+                <a16:creationId xmlns:a16="http://schemas.microsoft.com/office/drawing/2014/main" id="{D4C65540-7C30-4A06-9D27-5541F33FD820}"/>
+              </a:ext>
+            </a:extLst>
+          </p:cNvPr>
+          <p:cNvCxnSpPr>
+            <a:cxnSpLocks/>
+            <a:stCxn id="2" idx="3"/>
+            <a:endCxn id="55" idx="0"/>
+          </p:cNvCxnSpPr>
+          <p:nvPr/>
+        </p:nvCxnSpPr>
+        <p:spPr>
+          <a:xfrm>
+            <a:off x="2732567" y="4714655"/>
+            <a:ext cx="168703" cy="581394"/>
+          </a:xfrm>
+          <a:prstGeom prst="bentConnector2">
+            <a:avLst/>
+          </a:prstGeom>
+          <a:ln w="9525" cap="flat" cmpd="sng" algn="ctr">
+            <a:solidFill>
+              <a:schemeClr val="accent5"/>
+            </a:solidFill>
+            <a:prstDash val="dash"/>
+            <a:round/>
+            <a:headEnd type="none" w="med" len="med"/>
+            <a:tailEnd type="none" w="med" len="med"/>
+          </a:ln>
+        </p:spPr>
+        <p:style>
+          <a:lnRef idx="0">
+            <a:scrgbClr r="0" g="0" b="0"/>
+          </a:lnRef>
+          <a:fillRef idx="0">
+            <a:scrgbClr r="0" g="0" b="0"/>
+          </a:fillRef>
+          <a:effectRef idx="0">
+            <a:scrgbClr r="0" g="0" b="0"/>
+          </a:effectRef>
+          <a:fontRef idx="minor">
+            <a:schemeClr val="tx1"/>
+          </a:fontRef>
+        </p:style>
+      </p:cxnSp>
+      <p:cxnSp>
+        <p:nvCxnSpPr>
+          <p:cNvPr id="75" name="연결선: 꺾임 74">
+            <a:extLst>
+              <a:ext uri="{FF2B5EF4-FFF2-40B4-BE49-F238E27FC236}">
+                <a16:creationId xmlns:a16="http://schemas.microsoft.com/office/drawing/2014/main" id="{8EF64D6F-5928-4DFD-B3DD-8DC23067F385}"/>
+              </a:ext>
+            </a:extLst>
+          </p:cNvPr>
+          <p:cNvCxnSpPr>
+            <a:stCxn id="2" idx="3"/>
+            <a:endCxn id="49" idx="0"/>
+          </p:cNvCxnSpPr>
+          <p:nvPr/>
+        </p:nvCxnSpPr>
+        <p:spPr>
+          <a:xfrm>
+            <a:off x="2732567" y="4714655"/>
+            <a:ext cx="1218490" cy="575044"/>
+          </a:xfrm>
+          <a:prstGeom prst="bentConnector2">
+            <a:avLst/>
+          </a:prstGeom>
+        </p:spPr>
+        <p:style>
+          <a:lnRef idx="1">
+            <a:schemeClr val="accent1"/>
+          </a:lnRef>
+          <a:fillRef idx="0">
+            <a:schemeClr val="accent1"/>
+          </a:fillRef>
+          <a:effectRef idx="0">
+            <a:schemeClr val="accent1"/>
+          </a:effectRef>
+          <a:fontRef idx="minor">
+            <a:schemeClr val="tx1"/>
+          </a:fontRef>
+        </p:style>
+      </p:cxnSp>
+      <p:cxnSp>
+        <p:nvCxnSpPr>
+          <p:cNvPr id="77" name="연결선: 꺾임 76">
+            <a:extLst>
+              <a:ext uri="{FF2B5EF4-FFF2-40B4-BE49-F238E27FC236}">
+                <a16:creationId xmlns:a16="http://schemas.microsoft.com/office/drawing/2014/main" id="{90C08C4A-088F-4D0F-9EDD-D336BD9FF199}"/>
+              </a:ext>
+            </a:extLst>
+          </p:cNvPr>
+          <p:cNvCxnSpPr>
+            <a:stCxn id="59" idx="3"/>
+            <a:endCxn id="45" idx="1"/>
+          </p:cNvCxnSpPr>
+          <p:nvPr/>
+        </p:nvCxnSpPr>
+        <p:spPr>
+          <a:xfrm>
+            <a:off x="5520070" y="1940441"/>
+            <a:ext cx="432213" cy="1"/>
+          </a:xfrm>
+          <a:prstGeom prst="bentConnector3">
+            <a:avLst/>
+          </a:prstGeom>
+        </p:spPr>
+        <p:style>
+          <a:lnRef idx="3">
+            <a:schemeClr val="accent6"/>
+          </a:lnRef>
+          <a:fillRef idx="0">
+            <a:schemeClr val="accent6"/>
+          </a:fillRef>
+          <a:effectRef idx="2">
+            <a:schemeClr val="accent6"/>
+          </a:effectRef>
+          <a:fontRef idx="minor">
+            <a:schemeClr val="tx1"/>
+          </a:fontRef>
+        </p:style>
+      </p:cxnSp>
+      <p:cxnSp>
+        <p:nvCxnSpPr>
+          <p:cNvPr id="79" name="연결선: 꺾임 78">
+            <a:extLst>
+              <a:ext uri="{FF2B5EF4-FFF2-40B4-BE49-F238E27FC236}">
+                <a16:creationId xmlns:a16="http://schemas.microsoft.com/office/drawing/2014/main" id="{5A1E10AE-4B9B-48EE-AFCF-EE4E8B7F2F33}"/>
+              </a:ext>
+            </a:extLst>
+          </p:cNvPr>
+          <p:cNvCxnSpPr>
+            <a:stCxn id="59" idx="3"/>
+            <a:endCxn id="46" idx="1"/>
+          </p:cNvCxnSpPr>
+          <p:nvPr/>
+        </p:nvCxnSpPr>
+        <p:spPr>
+          <a:xfrm>
+            <a:off x="5520070" y="1940441"/>
+            <a:ext cx="432213" cy="744280"/>
+          </a:xfrm>
+          <a:prstGeom prst="bentConnector3">
+            <a:avLst/>
+          </a:prstGeom>
+        </p:spPr>
+        <p:style>
+          <a:lnRef idx="3">
+            <a:schemeClr val="accent1"/>
+          </a:lnRef>
+          <a:fillRef idx="0">
+            <a:schemeClr val="accent1"/>
+          </a:fillRef>
+          <a:effectRef idx="2">
+            <a:schemeClr val="accent1"/>
+          </a:effectRef>
+          <a:fontRef idx="minor">
+            <a:schemeClr val="tx1"/>
+          </a:fontRef>
+        </p:style>
+      </p:cxnSp>
+      <p:cxnSp>
+        <p:nvCxnSpPr>
+          <p:cNvPr id="81" name="연결선: 꺾임 80">
+            <a:extLst>
+              <a:ext uri="{FF2B5EF4-FFF2-40B4-BE49-F238E27FC236}">
+                <a16:creationId xmlns:a16="http://schemas.microsoft.com/office/drawing/2014/main" id="{5E84C4CB-BD4B-4581-89BD-42146119F245}"/>
+              </a:ext>
+            </a:extLst>
+          </p:cNvPr>
+          <p:cNvCxnSpPr>
+            <a:stCxn id="59" idx="3"/>
+            <a:endCxn id="48" idx="1"/>
+          </p:cNvCxnSpPr>
+          <p:nvPr/>
+        </p:nvCxnSpPr>
+        <p:spPr>
+          <a:xfrm>
+            <a:off x="5520070" y="1940441"/>
+            <a:ext cx="432213" cy="1488559"/>
+          </a:xfrm>
+          <a:prstGeom prst="bentConnector3">
+            <a:avLst/>
+          </a:prstGeom>
+        </p:spPr>
+        <p:style>
+          <a:lnRef idx="3">
+            <a:schemeClr val="accent6"/>
+          </a:lnRef>
+          <a:fillRef idx="0">
+            <a:schemeClr val="accent6"/>
+          </a:fillRef>
+          <a:effectRef idx="2">
+            <a:schemeClr val="accent6"/>
+          </a:effectRef>
+          <a:fontRef idx="minor">
+            <a:schemeClr val="tx1"/>
+          </a:fontRef>
+        </p:style>
+      </p:cxnSp>
+      <p:cxnSp>
+        <p:nvCxnSpPr>
+          <p:cNvPr id="85" name="연결선: 꺾임 84">
+            <a:extLst>
+              <a:ext uri="{FF2B5EF4-FFF2-40B4-BE49-F238E27FC236}">
+                <a16:creationId xmlns:a16="http://schemas.microsoft.com/office/drawing/2014/main" id="{B0023EB8-5A23-4910-91B0-861E64A48B0B}"/>
+              </a:ext>
+            </a:extLst>
+          </p:cNvPr>
+          <p:cNvCxnSpPr>
+            <a:stCxn id="59" idx="0"/>
+            <a:endCxn id="58" idx="0"/>
+          </p:cNvCxnSpPr>
+          <p:nvPr/>
+        </p:nvCxnSpPr>
+        <p:spPr>
+          <a:xfrm rot="16200000" flipH="1">
+            <a:off x="5809806" y="1018066"/>
+            <a:ext cx="744279" cy="1961707"/>
+          </a:xfrm>
+          <a:prstGeom prst="bentConnector3">
+            <a:avLst>
+              <a:gd name="adj1" fmla="val -30714"/>
+            </a:avLst>
+          </a:prstGeom>
+        </p:spPr>
+        <p:style>
+          <a:lnRef idx="3">
+            <a:schemeClr val="accent3"/>
+          </a:lnRef>
+          <a:fillRef idx="0">
+            <a:schemeClr val="accent3"/>
+          </a:fillRef>
+          <a:effectRef idx="2">
+            <a:schemeClr val="accent3"/>
+          </a:effectRef>
+          <a:fontRef idx="minor">
+            <a:schemeClr val="tx1"/>
+          </a:fontRef>
+        </p:style>
+      </p:cxnSp>
     </p:spTree>
     <p:extLst>
       <p:ext uri="{BB962C8B-B14F-4D97-AF65-F5344CB8AC3E}">

</xml_diff>

<commit_message>
update pin-map bom working... case working...
</commit_message>
<xml_diff>
--- a/doc/System Architecture.pptx
+++ b/doc/System Architecture.pptx
@@ -7,6 +7,7 @@
   <p:sldIdLst>
     <p:sldId id="260" r:id="rId2"/>
     <p:sldId id="261" r:id="rId3"/>
+    <p:sldId id="262" r:id="rId4"/>
   </p:sldIdLst>
   <p:sldSz cx="12192000" cy="6858000"/>
   <p:notesSz cx="6858000" cy="9144000"/>
@@ -260,7 +261,7 @@
           <a:p>
             <a:fld id="{2C69A316-7332-4585-BE20-51321A17224C}" type="datetimeFigureOut">
               <a:rPr lang="ko-KR" altLang="en-US" smtClean="0"/>
-              <a:t>2020-09-25</a:t>
+              <a:t>2020-10-02</a:t>
             </a:fld>
             <a:endParaRPr lang="ko-KR" altLang="en-US"/>
           </a:p>
@@ -458,7 +459,7 @@
           <a:p>
             <a:fld id="{2C69A316-7332-4585-BE20-51321A17224C}" type="datetimeFigureOut">
               <a:rPr lang="ko-KR" altLang="en-US" smtClean="0"/>
-              <a:t>2020-09-25</a:t>
+              <a:t>2020-10-02</a:t>
             </a:fld>
             <a:endParaRPr lang="ko-KR" altLang="en-US"/>
           </a:p>
@@ -666,7 +667,7 @@
           <a:p>
             <a:fld id="{2C69A316-7332-4585-BE20-51321A17224C}" type="datetimeFigureOut">
               <a:rPr lang="ko-KR" altLang="en-US" smtClean="0"/>
-              <a:t>2020-09-25</a:t>
+              <a:t>2020-10-02</a:t>
             </a:fld>
             <a:endParaRPr lang="ko-KR" altLang="en-US"/>
           </a:p>
@@ -864,7 +865,7 @@
           <a:p>
             <a:fld id="{2C69A316-7332-4585-BE20-51321A17224C}" type="datetimeFigureOut">
               <a:rPr lang="ko-KR" altLang="en-US" smtClean="0"/>
-              <a:t>2020-09-25</a:t>
+              <a:t>2020-10-02</a:t>
             </a:fld>
             <a:endParaRPr lang="ko-KR" altLang="en-US"/>
           </a:p>
@@ -1139,7 +1140,7 @@
           <a:p>
             <a:fld id="{2C69A316-7332-4585-BE20-51321A17224C}" type="datetimeFigureOut">
               <a:rPr lang="ko-KR" altLang="en-US" smtClean="0"/>
-              <a:t>2020-09-25</a:t>
+              <a:t>2020-10-02</a:t>
             </a:fld>
             <a:endParaRPr lang="ko-KR" altLang="en-US"/>
           </a:p>
@@ -1404,7 +1405,7 @@
           <a:p>
             <a:fld id="{2C69A316-7332-4585-BE20-51321A17224C}" type="datetimeFigureOut">
               <a:rPr lang="ko-KR" altLang="en-US" smtClean="0"/>
-              <a:t>2020-09-25</a:t>
+              <a:t>2020-10-02</a:t>
             </a:fld>
             <a:endParaRPr lang="ko-KR" altLang="en-US"/>
           </a:p>
@@ -1816,7 +1817,7 @@
           <a:p>
             <a:fld id="{2C69A316-7332-4585-BE20-51321A17224C}" type="datetimeFigureOut">
               <a:rPr lang="ko-KR" altLang="en-US" smtClean="0"/>
-              <a:t>2020-09-25</a:t>
+              <a:t>2020-10-02</a:t>
             </a:fld>
             <a:endParaRPr lang="ko-KR" altLang="en-US"/>
           </a:p>
@@ -1957,7 +1958,7 @@
           <a:p>
             <a:fld id="{2C69A316-7332-4585-BE20-51321A17224C}" type="datetimeFigureOut">
               <a:rPr lang="ko-KR" altLang="en-US" smtClean="0"/>
-              <a:t>2020-09-25</a:t>
+              <a:t>2020-10-02</a:t>
             </a:fld>
             <a:endParaRPr lang="ko-KR" altLang="en-US"/>
           </a:p>
@@ -2070,7 +2071,7 @@
           <a:p>
             <a:fld id="{2C69A316-7332-4585-BE20-51321A17224C}" type="datetimeFigureOut">
               <a:rPr lang="ko-KR" altLang="en-US" smtClean="0"/>
-              <a:t>2020-09-25</a:t>
+              <a:t>2020-10-02</a:t>
             </a:fld>
             <a:endParaRPr lang="ko-KR" altLang="en-US"/>
           </a:p>
@@ -2381,7 +2382,7 @@
           <a:p>
             <a:fld id="{2C69A316-7332-4585-BE20-51321A17224C}" type="datetimeFigureOut">
               <a:rPr lang="ko-KR" altLang="en-US" smtClean="0"/>
-              <a:t>2020-09-25</a:t>
+              <a:t>2020-10-02</a:t>
             </a:fld>
             <a:endParaRPr lang="ko-KR" altLang="en-US"/>
           </a:p>
@@ -2669,7 +2670,7 @@
           <a:p>
             <a:fld id="{2C69A316-7332-4585-BE20-51321A17224C}" type="datetimeFigureOut">
               <a:rPr lang="ko-KR" altLang="en-US" smtClean="0"/>
-              <a:t>2020-09-25</a:t>
+              <a:t>2020-10-02</a:t>
             </a:fld>
             <a:endParaRPr lang="ko-KR" altLang="en-US"/>
           </a:p>
@@ -2910,7 +2911,7 @@
           <a:p>
             <a:fld id="{2C69A316-7332-4585-BE20-51321A17224C}" type="datetimeFigureOut">
               <a:rPr lang="ko-KR" altLang="en-US" smtClean="0"/>
-              <a:t>2020-09-25</a:t>
+              <a:t>2020-10-02</a:t>
             </a:fld>
             <a:endParaRPr lang="ko-KR" altLang="en-US"/>
           </a:p>
@@ -8401,6 +8402,1069 @@
 </p:sld>
 </file>
 
+<file path=ppt/slides/slide3.xml><?xml version="1.0" encoding="utf-8"?>
+<p:sld xmlns:a="http://schemas.openxmlformats.org/drawingml/2006/main" xmlns:r="http://schemas.openxmlformats.org/officeDocument/2006/relationships" xmlns:p="http://schemas.openxmlformats.org/presentationml/2006/main">
+  <p:cSld>
+    <p:spTree>
+      <p:nvGrpSpPr>
+        <p:cNvPr id="1" name=""/>
+        <p:cNvGrpSpPr/>
+        <p:nvPr/>
+      </p:nvGrpSpPr>
+      <p:grpSpPr>
+        <a:xfrm>
+          <a:off x="0" y="0"/>
+          <a:ext cx="0" cy="0"/>
+          <a:chOff x="0" y="0"/>
+          <a:chExt cx="0" cy="0"/>
+        </a:xfrm>
+      </p:grpSpPr>
+      <p:sp>
+        <p:nvSpPr>
+          <p:cNvPr id="4" name="직사각형 3">
+            <a:extLst>
+              <a:ext uri="{FF2B5EF4-FFF2-40B4-BE49-F238E27FC236}">
+                <a16:creationId xmlns:a16="http://schemas.microsoft.com/office/drawing/2014/main" id="{68B011FE-E4F1-48C4-8168-C5EB798D2803}"/>
+              </a:ext>
+            </a:extLst>
+          </p:cNvPr>
+          <p:cNvSpPr/>
+          <p:nvPr/>
+        </p:nvSpPr>
+        <p:spPr>
+          <a:xfrm>
+            <a:off x="4124518" y="6252151"/>
+            <a:ext cx="954642" cy="378736"/>
+          </a:xfrm>
+          <a:prstGeom prst="rect">
+            <a:avLst/>
+          </a:prstGeom>
+        </p:spPr>
+        <p:style>
+          <a:lnRef idx="2">
+            <a:schemeClr val="accent1">
+              <a:shade val="50000"/>
+            </a:schemeClr>
+          </a:lnRef>
+          <a:fillRef idx="1">
+            <a:schemeClr val="accent1"/>
+          </a:fillRef>
+          <a:effectRef idx="0">
+            <a:schemeClr val="accent1"/>
+          </a:effectRef>
+          <a:fontRef idx="minor">
+            <a:schemeClr val="lt1"/>
+          </a:fontRef>
+        </p:style>
+        <p:txBody>
+          <a:bodyPr rtlCol="0" anchor="ctr"/>
+          <a:lstStyle/>
+          <a:p>
+            <a:pPr algn="ctr"/>
+            <a:r>
+              <a:rPr lang="en-US" altLang="ko-KR" sz="900" dirty="0"/>
+              <a:t>Micro USB-B</a:t>
+            </a:r>
+            <a:endParaRPr lang="ko-KR" altLang="en-US" sz="900" dirty="0"/>
+          </a:p>
+        </p:txBody>
+      </p:sp>
+      <p:sp>
+        <p:nvSpPr>
+          <p:cNvPr id="5" name="직사각형 4">
+            <a:extLst>
+              <a:ext uri="{FF2B5EF4-FFF2-40B4-BE49-F238E27FC236}">
+                <a16:creationId xmlns:a16="http://schemas.microsoft.com/office/drawing/2014/main" id="{F0ABA86C-2D43-4A92-B962-C744984AE5FA}"/>
+              </a:ext>
+            </a:extLst>
+          </p:cNvPr>
+          <p:cNvSpPr/>
+          <p:nvPr/>
+        </p:nvSpPr>
+        <p:spPr>
+          <a:xfrm>
+            <a:off x="7229643" y="6189767"/>
+            <a:ext cx="1041633" cy="414076"/>
+          </a:xfrm>
+          <a:prstGeom prst="rect">
+            <a:avLst/>
+          </a:prstGeom>
+        </p:spPr>
+        <p:style>
+          <a:lnRef idx="2">
+            <a:schemeClr val="accent1">
+              <a:shade val="50000"/>
+            </a:schemeClr>
+          </a:lnRef>
+          <a:fillRef idx="1">
+            <a:schemeClr val="accent1"/>
+          </a:fillRef>
+          <a:effectRef idx="0">
+            <a:schemeClr val="accent1"/>
+          </a:effectRef>
+          <a:fontRef idx="minor">
+            <a:schemeClr val="lt1"/>
+          </a:fontRef>
+        </p:style>
+        <p:txBody>
+          <a:bodyPr rtlCol="0" anchor="ctr"/>
+          <a:lstStyle/>
+          <a:p>
+            <a:pPr algn="ctr"/>
+            <a:r>
+              <a:rPr lang="en-US" altLang="ko-KR" sz="900" dirty="0"/>
+              <a:t>USB-A</a:t>
+            </a:r>
+          </a:p>
+        </p:txBody>
+      </p:sp>
+      <p:sp>
+        <p:nvSpPr>
+          <p:cNvPr id="6" name="직사각형 5">
+            <a:extLst>
+              <a:ext uri="{FF2B5EF4-FFF2-40B4-BE49-F238E27FC236}">
+                <a16:creationId xmlns:a16="http://schemas.microsoft.com/office/drawing/2014/main" id="{B5F2D83B-CC8C-47B9-9506-93B579881AAB}"/>
+              </a:ext>
+            </a:extLst>
+          </p:cNvPr>
+          <p:cNvSpPr/>
+          <p:nvPr/>
+        </p:nvSpPr>
+        <p:spPr>
+          <a:xfrm>
+            <a:off x="9461409" y="1282170"/>
+            <a:ext cx="1368779" cy="602890"/>
+          </a:xfrm>
+          <a:prstGeom prst="rect">
+            <a:avLst/>
+          </a:prstGeom>
+        </p:spPr>
+        <p:style>
+          <a:lnRef idx="2">
+            <a:schemeClr val="accent1">
+              <a:shade val="50000"/>
+            </a:schemeClr>
+          </a:lnRef>
+          <a:fillRef idx="1">
+            <a:schemeClr val="accent1"/>
+          </a:fillRef>
+          <a:effectRef idx="0">
+            <a:schemeClr val="accent1"/>
+          </a:effectRef>
+          <a:fontRef idx="minor">
+            <a:schemeClr val="lt1"/>
+          </a:fontRef>
+        </p:style>
+        <p:txBody>
+          <a:bodyPr rtlCol="0" anchor="ctr"/>
+          <a:lstStyle/>
+          <a:p>
+            <a:pPr algn="ctr"/>
+            <a:r>
+              <a:rPr lang="en-US" altLang="ko-KR" sz="900" dirty="0"/>
+              <a:t>SD-Card</a:t>
+            </a:r>
+          </a:p>
+        </p:txBody>
+      </p:sp>
+      <p:sp>
+        <p:nvSpPr>
+          <p:cNvPr id="7" name="직사각형 6">
+            <a:extLst>
+              <a:ext uri="{FF2B5EF4-FFF2-40B4-BE49-F238E27FC236}">
+                <a16:creationId xmlns:a16="http://schemas.microsoft.com/office/drawing/2014/main" id="{9BA64649-903F-4555-9956-94A9D449DC4B}"/>
+              </a:ext>
+            </a:extLst>
+          </p:cNvPr>
+          <p:cNvSpPr/>
+          <p:nvPr/>
+        </p:nvSpPr>
+        <p:spPr>
+          <a:xfrm>
+            <a:off x="9461409" y="4142038"/>
+            <a:ext cx="1368779" cy="602890"/>
+          </a:xfrm>
+          <a:prstGeom prst="rect">
+            <a:avLst/>
+          </a:prstGeom>
+        </p:spPr>
+        <p:style>
+          <a:lnRef idx="2">
+            <a:schemeClr val="accent1">
+              <a:shade val="50000"/>
+            </a:schemeClr>
+          </a:lnRef>
+          <a:fillRef idx="1">
+            <a:schemeClr val="accent1"/>
+          </a:fillRef>
+          <a:effectRef idx="0">
+            <a:schemeClr val="accent1"/>
+          </a:effectRef>
+          <a:fontRef idx="minor">
+            <a:schemeClr val="lt1"/>
+          </a:fontRef>
+        </p:style>
+        <p:txBody>
+          <a:bodyPr rtlCol="0" anchor="ctr"/>
+          <a:lstStyle/>
+          <a:p>
+            <a:pPr algn="ctr"/>
+            <a:r>
+              <a:rPr lang="en-US" altLang="ko-KR" sz="900" dirty="0"/>
+              <a:t>Audio Jack</a:t>
+            </a:r>
+          </a:p>
+        </p:txBody>
+      </p:sp>
+      <p:sp>
+        <p:nvSpPr>
+          <p:cNvPr id="8" name="직사각형 7">
+            <a:extLst>
+              <a:ext uri="{FF2B5EF4-FFF2-40B4-BE49-F238E27FC236}">
+                <a16:creationId xmlns:a16="http://schemas.microsoft.com/office/drawing/2014/main" id="{EBCE2147-4E93-4E37-8BFE-38A8EF821BC6}"/>
+              </a:ext>
+            </a:extLst>
+          </p:cNvPr>
+          <p:cNvSpPr/>
+          <p:nvPr/>
+        </p:nvSpPr>
+        <p:spPr>
+          <a:xfrm>
+            <a:off x="5816544" y="5498542"/>
+            <a:ext cx="813447" cy="490812"/>
+          </a:xfrm>
+          <a:prstGeom prst="rect">
+            <a:avLst/>
+          </a:prstGeom>
+        </p:spPr>
+        <p:style>
+          <a:lnRef idx="2">
+            <a:schemeClr val="accent1">
+              <a:shade val="50000"/>
+            </a:schemeClr>
+          </a:lnRef>
+          <a:fillRef idx="1">
+            <a:schemeClr val="accent1"/>
+          </a:fillRef>
+          <a:effectRef idx="0">
+            <a:schemeClr val="accent1"/>
+          </a:effectRef>
+          <a:fontRef idx="minor">
+            <a:schemeClr val="lt1"/>
+          </a:fontRef>
+        </p:style>
+        <p:txBody>
+          <a:bodyPr rtlCol="0" anchor="ctr"/>
+          <a:lstStyle/>
+          <a:p>
+            <a:pPr algn="ctr"/>
+            <a:r>
+              <a:rPr lang="en-US" altLang="ko-KR" sz="900" dirty="0"/>
+              <a:t>Enter</a:t>
+            </a:r>
+          </a:p>
+        </p:txBody>
+      </p:sp>
+      <p:sp>
+        <p:nvSpPr>
+          <p:cNvPr id="9" name="직사각형 8">
+            <a:extLst>
+              <a:ext uri="{FF2B5EF4-FFF2-40B4-BE49-F238E27FC236}">
+                <a16:creationId xmlns:a16="http://schemas.microsoft.com/office/drawing/2014/main" id="{B13C1389-28C7-456D-8EBC-ECDE6D026A0F}"/>
+              </a:ext>
+            </a:extLst>
+          </p:cNvPr>
+          <p:cNvSpPr/>
+          <p:nvPr/>
+        </p:nvSpPr>
+        <p:spPr>
+          <a:xfrm>
+            <a:off x="2727012" y="1104396"/>
+            <a:ext cx="6624896" cy="3779658"/>
+          </a:xfrm>
+          <a:prstGeom prst="rect">
+            <a:avLst/>
+          </a:prstGeom>
+        </p:spPr>
+        <p:style>
+          <a:lnRef idx="2">
+            <a:schemeClr val="accent1">
+              <a:shade val="50000"/>
+            </a:schemeClr>
+          </a:lnRef>
+          <a:fillRef idx="1">
+            <a:schemeClr val="accent1"/>
+          </a:fillRef>
+          <a:effectRef idx="0">
+            <a:schemeClr val="accent1"/>
+          </a:effectRef>
+          <a:fontRef idx="minor">
+            <a:schemeClr val="lt1"/>
+          </a:fontRef>
+        </p:style>
+        <p:txBody>
+          <a:bodyPr rtlCol="0" anchor="ctr"/>
+          <a:lstStyle/>
+          <a:p>
+            <a:pPr algn="ctr"/>
+            <a:r>
+              <a:rPr lang="en-US" altLang="ko-KR" sz="900" dirty="0"/>
+              <a:t>E-INK</a:t>
+            </a:r>
+          </a:p>
+        </p:txBody>
+      </p:sp>
+      <p:sp>
+        <p:nvSpPr>
+          <p:cNvPr id="10" name="직사각형 9">
+            <a:extLst>
+              <a:ext uri="{FF2B5EF4-FFF2-40B4-BE49-F238E27FC236}">
+                <a16:creationId xmlns:a16="http://schemas.microsoft.com/office/drawing/2014/main" id="{37EE1DD2-503F-4FAF-9806-9DEE7DC6BD5D}"/>
+              </a:ext>
+            </a:extLst>
+          </p:cNvPr>
+          <p:cNvSpPr/>
+          <p:nvPr/>
+        </p:nvSpPr>
+        <p:spPr>
+          <a:xfrm>
+            <a:off x="2727012" y="385565"/>
+            <a:ext cx="1368779" cy="602890"/>
+          </a:xfrm>
+          <a:prstGeom prst="rect">
+            <a:avLst/>
+          </a:prstGeom>
+        </p:spPr>
+        <p:style>
+          <a:lnRef idx="2">
+            <a:schemeClr val="accent1">
+              <a:shade val="50000"/>
+            </a:schemeClr>
+          </a:lnRef>
+          <a:fillRef idx="1">
+            <a:schemeClr val="accent1"/>
+          </a:fillRef>
+          <a:effectRef idx="0">
+            <a:schemeClr val="accent1"/>
+          </a:effectRef>
+          <a:fontRef idx="minor">
+            <a:schemeClr val="lt1"/>
+          </a:fontRef>
+        </p:style>
+        <p:txBody>
+          <a:bodyPr rtlCol="0" anchor="ctr"/>
+          <a:lstStyle/>
+          <a:p>
+            <a:pPr algn="ctr"/>
+            <a:r>
+              <a:rPr lang="en-US" altLang="ko-KR" sz="900" dirty="0"/>
+              <a:t>Speaker-L</a:t>
+            </a:r>
+          </a:p>
+        </p:txBody>
+      </p:sp>
+      <p:sp>
+        <p:nvSpPr>
+          <p:cNvPr id="11" name="직사각형 10">
+            <a:extLst>
+              <a:ext uri="{FF2B5EF4-FFF2-40B4-BE49-F238E27FC236}">
+                <a16:creationId xmlns:a16="http://schemas.microsoft.com/office/drawing/2014/main" id="{D6C9CF5D-5E70-4ABA-B6B4-7529919EA615}"/>
+              </a:ext>
+            </a:extLst>
+          </p:cNvPr>
+          <p:cNvSpPr/>
+          <p:nvPr/>
+        </p:nvSpPr>
+        <p:spPr>
+          <a:xfrm>
+            <a:off x="7983128" y="385565"/>
+            <a:ext cx="1368779" cy="602890"/>
+          </a:xfrm>
+          <a:prstGeom prst="rect">
+            <a:avLst/>
+          </a:prstGeom>
+        </p:spPr>
+        <p:style>
+          <a:lnRef idx="2">
+            <a:schemeClr val="accent1">
+              <a:shade val="50000"/>
+            </a:schemeClr>
+          </a:lnRef>
+          <a:fillRef idx="1">
+            <a:schemeClr val="accent1"/>
+          </a:fillRef>
+          <a:effectRef idx="0">
+            <a:schemeClr val="accent1"/>
+          </a:effectRef>
+          <a:fontRef idx="minor">
+            <a:schemeClr val="lt1"/>
+          </a:fontRef>
+        </p:style>
+        <p:txBody>
+          <a:bodyPr rtlCol="0" anchor="ctr"/>
+          <a:lstStyle/>
+          <a:p>
+            <a:pPr algn="ctr"/>
+            <a:r>
+              <a:rPr lang="en-US" altLang="ko-KR" sz="900" dirty="0"/>
+              <a:t>Speaker-R</a:t>
+            </a:r>
+          </a:p>
+        </p:txBody>
+      </p:sp>
+      <p:sp>
+        <p:nvSpPr>
+          <p:cNvPr id="12" name="직사각형 11">
+            <a:extLst>
+              <a:ext uri="{FF2B5EF4-FFF2-40B4-BE49-F238E27FC236}">
+                <a16:creationId xmlns:a16="http://schemas.microsoft.com/office/drawing/2014/main" id="{B1128772-21B4-4688-8F1F-41A35124D237}"/>
+              </a:ext>
+            </a:extLst>
+          </p:cNvPr>
+          <p:cNvSpPr/>
+          <p:nvPr/>
+        </p:nvSpPr>
+        <p:spPr>
+          <a:xfrm>
+            <a:off x="4914451" y="5568103"/>
+            <a:ext cx="813447" cy="378735"/>
+          </a:xfrm>
+          <a:prstGeom prst="rect">
+            <a:avLst/>
+          </a:prstGeom>
+        </p:spPr>
+        <p:style>
+          <a:lnRef idx="2">
+            <a:schemeClr val="accent1">
+              <a:shade val="50000"/>
+            </a:schemeClr>
+          </a:lnRef>
+          <a:fillRef idx="1">
+            <a:schemeClr val="accent1"/>
+          </a:fillRef>
+          <a:effectRef idx="0">
+            <a:schemeClr val="accent1"/>
+          </a:effectRef>
+          <a:fontRef idx="minor">
+            <a:schemeClr val="lt1"/>
+          </a:fontRef>
+        </p:style>
+        <p:txBody>
+          <a:bodyPr rtlCol="0" anchor="ctr"/>
+          <a:lstStyle/>
+          <a:p>
+            <a:pPr algn="ctr"/>
+            <a:r>
+              <a:rPr lang="en-US" altLang="ko-KR" sz="900" dirty="0"/>
+              <a:t>Left</a:t>
+            </a:r>
+          </a:p>
+        </p:txBody>
+      </p:sp>
+      <p:sp>
+        <p:nvSpPr>
+          <p:cNvPr id="13" name="직사각형 12">
+            <a:extLst>
+              <a:ext uri="{FF2B5EF4-FFF2-40B4-BE49-F238E27FC236}">
+                <a16:creationId xmlns:a16="http://schemas.microsoft.com/office/drawing/2014/main" id="{37AB781E-ABF4-4788-AAD9-447CD48C9000}"/>
+              </a:ext>
+            </a:extLst>
+          </p:cNvPr>
+          <p:cNvSpPr/>
+          <p:nvPr/>
+        </p:nvSpPr>
+        <p:spPr>
+          <a:xfrm>
+            <a:off x="6718636" y="5554581"/>
+            <a:ext cx="813447" cy="378735"/>
+          </a:xfrm>
+          <a:prstGeom prst="rect">
+            <a:avLst/>
+          </a:prstGeom>
+        </p:spPr>
+        <p:style>
+          <a:lnRef idx="2">
+            <a:schemeClr val="accent1">
+              <a:shade val="50000"/>
+            </a:schemeClr>
+          </a:lnRef>
+          <a:fillRef idx="1">
+            <a:schemeClr val="accent1"/>
+          </a:fillRef>
+          <a:effectRef idx="0">
+            <a:schemeClr val="accent1"/>
+          </a:effectRef>
+          <a:fontRef idx="minor">
+            <a:schemeClr val="lt1"/>
+          </a:fontRef>
+        </p:style>
+        <p:txBody>
+          <a:bodyPr rtlCol="0" anchor="ctr"/>
+          <a:lstStyle/>
+          <a:p>
+            <a:pPr algn="ctr"/>
+            <a:r>
+              <a:rPr lang="en-US" altLang="ko-KR" sz="900" dirty="0"/>
+              <a:t>Right</a:t>
+            </a:r>
+          </a:p>
+        </p:txBody>
+      </p:sp>
+      <p:sp>
+        <p:nvSpPr>
+          <p:cNvPr id="14" name="직사각형 13">
+            <a:extLst>
+              <a:ext uri="{FF2B5EF4-FFF2-40B4-BE49-F238E27FC236}">
+                <a16:creationId xmlns:a16="http://schemas.microsoft.com/office/drawing/2014/main" id="{125C456B-18FC-40D2-BC3C-CD79BF7E9E86}"/>
+              </a:ext>
+            </a:extLst>
+          </p:cNvPr>
+          <p:cNvSpPr/>
+          <p:nvPr/>
+        </p:nvSpPr>
+        <p:spPr>
+          <a:xfrm>
+            <a:off x="5816544" y="6097567"/>
+            <a:ext cx="813447" cy="378735"/>
+          </a:xfrm>
+          <a:prstGeom prst="rect">
+            <a:avLst/>
+          </a:prstGeom>
+        </p:spPr>
+        <p:style>
+          <a:lnRef idx="2">
+            <a:schemeClr val="accent1">
+              <a:shade val="50000"/>
+            </a:schemeClr>
+          </a:lnRef>
+          <a:fillRef idx="1">
+            <a:schemeClr val="accent1"/>
+          </a:fillRef>
+          <a:effectRef idx="0">
+            <a:schemeClr val="accent1"/>
+          </a:effectRef>
+          <a:fontRef idx="minor">
+            <a:schemeClr val="lt1"/>
+          </a:fontRef>
+        </p:style>
+        <p:txBody>
+          <a:bodyPr rtlCol="0" anchor="ctr"/>
+          <a:lstStyle/>
+          <a:p>
+            <a:pPr algn="ctr"/>
+            <a:r>
+              <a:rPr lang="en-US" altLang="ko-KR" sz="900" dirty="0"/>
+              <a:t>Down</a:t>
+            </a:r>
+          </a:p>
+        </p:txBody>
+      </p:sp>
+      <p:sp>
+        <p:nvSpPr>
+          <p:cNvPr id="15" name="직사각형 14">
+            <a:extLst>
+              <a:ext uri="{FF2B5EF4-FFF2-40B4-BE49-F238E27FC236}">
+                <a16:creationId xmlns:a16="http://schemas.microsoft.com/office/drawing/2014/main" id="{F9181419-2623-4674-BF95-35742586E4E6}"/>
+              </a:ext>
+            </a:extLst>
+          </p:cNvPr>
+          <p:cNvSpPr/>
+          <p:nvPr/>
+        </p:nvSpPr>
+        <p:spPr>
+          <a:xfrm>
+            <a:off x="5825670" y="4999999"/>
+            <a:ext cx="813447" cy="378735"/>
+          </a:xfrm>
+          <a:prstGeom prst="rect">
+            <a:avLst/>
+          </a:prstGeom>
+        </p:spPr>
+        <p:style>
+          <a:lnRef idx="2">
+            <a:schemeClr val="accent1">
+              <a:shade val="50000"/>
+            </a:schemeClr>
+          </a:lnRef>
+          <a:fillRef idx="1">
+            <a:schemeClr val="accent1"/>
+          </a:fillRef>
+          <a:effectRef idx="0">
+            <a:schemeClr val="accent1"/>
+          </a:effectRef>
+          <a:fontRef idx="minor">
+            <a:schemeClr val="lt1"/>
+          </a:fontRef>
+        </p:style>
+        <p:txBody>
+          <a:bodyPr rtlCol="0" anchor="ctr"/>
+          <a:lstStyle/>
+          <a:p>
+            <a:pPr algn="ctr"/>
+            <a:r>
+              <a:rPr lang="en-US" altLang="ko-KR" sz="900" dirty="0"/>
+              <a:t>Up</a:t>
+            </a:r>
+          </a:p>
+        </p:txBody>
+      </p:sp>
+      <p:sp>
+        <p:nvSpPr>
+          <p:cNvPr id="16" name="직사각형 15">
+            <a:extLst>
+              <a:ext uri="{FF2B5EF4-FFF2-40B4-BE49-F238E27FC236}">
+                <a16:creationId xmlns:a16="http://schemas.microsoft.com/office/drawing/2014/main" id="{B75EC4EF-357E-462A-B707-4BAF175764A3}"/>
+              </a:ext>
+            </a:extLst>
+          </p:cNvPr>
+          <p:cNvSpPr/>
+          <p:nvPr/>
+        </p:nvSpPr>
+        <p:spPr>
+          <a:xfrm>
+            <a:off x="2727012" y="5189367"/>
+            <a:ext cx="813447" cy="490812"/>
+          </a:xfrm>
+          <a:prstGeom prst="rect">
+            <a:avLst/>
+          </a:prstGeom>
+        </p:spPr>
+        <p:style>
+          <a:lnRef idx="2">
+            <a:schemeClr val="accent1">
+              <a:shade val="50000"/>
+            </a:schemeClr>
+          </a:lnRef>
+          <a:fillRef idx="1">
+            <a:schemeClr val="accent1"/>
+          </a:fillRef>
+          <a:effectRef idx="0">
+            <a:schemeClr val="accent1"/>
+          </a:effectRef>
+          <a:fontRef idx="minor">
+            <a:schemeClr val="lt1"/>
+          </a:fontRef>
+        </p:style>
+        <p:txBody>
+          <a:bodyPr rtlCol="0" anchor="ctr"/>
+          <a:lstStyle/>
+          <a:p>
+            <a:pPr algn="ctr"/>
+            <a:r>
+              <a:rPr lang="en-US" altLang="ko-KR" sz="900" dirty="0"/>
+              <a:t>Func1</a:t>
+            </a:r>
+          </a:p>
+        </p:txBody>
+      </p:sp>
+      <p:sp>
+        <p:nvSpPr>
+          <p:cNvPr id="17" name="직사각형 16">
+            <a:extLst>
+              <a:ext uri="{FF2B5EF4-FFF2-40B4-BE49-F238E27FC236}">
+                <a16:creationId xmlns:a16="http://schemas.microsoft.com/office/drawing/2014/main" id="{E2A3F3A8-87EB-4C72-9F89-E97D62533FE0}"/>
+              </a:ext>
+            </a:extLst>
+          </p:cNvPr>
+          <p:cNvSpPr/>
+          <p:nvPr/>
+        </p:nvSpPr>
+        <p:spPr>
+          <a:xfrm>
+            <a:off x="8538460" y="5189367"/>
+            <a:ext cx="813447" cy="490812"/>
+          </a:xfrm>
+          <a:prstGeom prst="rect">
+            <a:avLst/>
+          </a:prstGeom>
+        </p:spPr>
+        <p:style>
+          <a:lnRef idx="2">
+            <a:schemeClr val="accent1">
+              <a:shade val="50000"/>
+            </a:schemeClr>
+          </a:lnRef>
+          <a:fillRef idx="1">
+            <a:schemeClr val="accent1"/>
+          </a:fillRef>
+          <a:effectRef idx="0">
+            <a:schemeClr val="accent1"/>
+          </a:effectRef>
+          <a:fontRef idx="minor">
+            <a:schemeClr val="lt1"/>
+          </a:fontRef>
+        </p:style>
+        <p:txBody>
+          <a:bodyPr rtlCol="0" anchor="ctr"/>
+          <a:lstStyle/>
+          <a:p>
+            <a:pPr algn="ctr"/>
+            <a:r>
+              <a:rPr lang="en-US" altLang="ko-KR" sz="900" dirty="0"/>
+              <a:t>Func2</a:t>
+            </a:r>
+          </a:p>
+        </p:txBody>
+      </p:sp>
+      <p:sp>
+        <p:nvSpPr>
+          <p:cNvPr id="18" name="직사각형 17">
+            <a:extLst>
+              <a:ext uri="{FF2B5EF4-FFF2-40B4-BE49-F238E27FC236}">
+                <a16:creationId xmlns:a16="http://schemas.microsoft.com/office/drawing/2014/main" id="{BC3D70DB-633F-4056-ABA1-B860A11ACCC2}"/>
+              </a:ext>
+            </a:extLst>
+          </p:cNvPr>
+          <p:cNvSpPr/>
+          <p:nvPr/>
+        </p:nvSpPr>
+        <p:spPr>
+          <a:xfrm>
+            <a:off x="8538460" y="5902399"/>
+            <a:ext cx="813447" cy="490812"/>
+          </a:xfrm>
+          <a:prstGeom prst="rect">
+            <a:avLst/>
+          </a:prstGeom>
+        </p:spPr>
+        <p:style>
+          <a:lnRef idx="2">
+            <a:schemeClr val="accent1">
+              <a:shade val="50000"/>
+            </a:schemeClr>
+          </a:lnRef>
+          <a:fillRef idx="1">
+            <a:schemeClr val="accent1"/>
+          </a:fillRef>
+          <a:effectRef idx="0">
+            <a:schemeClr val="accent1"/>
+          </a:effectRef>
+          <a:fontRef idx="minor">
+            <a:schemeClr val="lt1"/>
+          </a:fontRef>
+        </p:style>
+        <p:txBody>
+          <a:bodyPr rtlCol="0" anchor="ctr"/>
+          <a:lstStyle/>
+          <a:p>
+            <a:pPr algn="ctr"/>
+            <a:r>
+              <a:rPr lang="en-US" altLang="ko-KR" sz="900" dirty="0"/>
+              <a:t>Menu</a:t>
+            </a:r>
+          </a:p>
+        </p:txBody>
+      </p:sp>
+      <p:sp>
+        <p:nvSpPr>
+          <p:cNvPr id="19" name="직사각형 18">
+            <a:extLst>
+              <a:ext uri="{FF2B5EF4-FFF2-40B4-BE49-F238E27FC236}">
+                <a16:creationId xmlns:a16="http://schemas.microsoft.com/office/drawing/2014/main" id="{413075D8-40C8-473D-98DE-75005A4A54E5}"/>
+              </a:ext>
+            </a:extLst>
+          </p:cNvPr>
+          <p:cNvSpPr/>
+          <p:nvPr/>
+        </p:nvSpPr>
+        <p:spPr>
+          <a:xfrm>
+            <a:off x="2727012" y="5902399"/>
+            <a:ext cx="813447" cy="490812"/>
+          </a:xfrm>
+          <a:prstGeom prst="rect">
+            <a:avLst/>
+          </a:prstGeom>
+        </p:spPr>
+        <p:style>
+          <a:lnRef idx="2">
+            <a:schemeClr val="accent1">
+              <a:shade val="50000"/>
+            </a:schemeClr>
+          </a:lnRef>
+          <a:fillRef idx="1">
+            <a:schemeClr val="accent1"/>
+          </a:fillRef>
+          <a:effectRef idx="0">
+            <a:schemeClr val="accent1"/>
+          </a:effectRef>
+          <a:fontRef idx="minor">
+            <a:schemeClr val="lt1"/>
+          </a:fontRef>
+        </p:style>
+        <p:txBody>
+          <a:bodyPr rtlCol="0" anchor="ctr"/>
+          <a:lstStyle/>
+          <a:p>
+            <a:pPr algn="ctr"/>
+            <a:r>
+              <a:rPr lang="en-US" altLang="ko-KR" sz="900" dirty="0"/>
+              <a:t>Escape</a:t>
+            </a:r>
+          </a:p>
+        </p:txBody>
+      </p:sp>
+      <p:sp>
+        <p:nvSpPr>
+          <p:cNvPr id="20" name="직사각형 19">
+            <a:extLst>
+              <a:ext uri="{FF2B5EF4-FFF2-40B4-BE49-F238E27FC236}">
+                <a16:creationId xmlns:a16="http://schemas.microsoft.com/office/drawing/2014/main" id="{5FF94936-EEA3-48AC-A719-9E814F2B64BD}"/>
+              </a:ext>
+            </a:extLst>
+          </p:cNvPr>
+          <p:cNvSpPr/>
+          <p:nvPr/>
+        </p:nvSpPr>
+        <p:spPr>
+          <a:xfrm>
+            <a:off x="9461409" y="2229015"/>
+            <a:ext cx="1368779" cy="602890"/>
+          </a:xfrm>
+          <a:prstGeom prst="rect">
+            <a:avLst/>
+          </a:prstGeom>
+        </p:spPr>
+        <p:style>
+          <a:lnRef idx="2">
+            <a:schemeClr val="accent1">
+              <a:shade val="50000"/>
+            </a:schemeClr>
+          </a:lnRef>
+          <a:fillRef idx="1">
+            <a:schemeClr val="accent1"/>
+          </a:fillRef>
+          <a:effectRef idx="0">
+            <a:schemeClr val="accent1"/>
+          </a:effectRef>
+          <a:fontRef idx="minor">
+            <a:schemeClr val="lt1"/>
+          </a:fontRef>
+        </p:style>
+        <p:txBody>
+          <a:bodyPr rtlCol="0" anchor="ctr"/>
+          <a:lstStyle/>
+          <a:p>
+            <a:pPr algn="ctr"/>
+            <a:r>
+              <a:rPr lang="en-US" altLang="ko-KR" sz="900" dirty="0"/>
+              <a:t>USB-OTG</a:t>
+            </a:r>
+          </a:p>
+        </p:txBody>
+      </p:sp>
+      <p:sp>
+        <p:nvSpPr>
+          <p:cNvPr id="21" name="직사각형 20">
+            <a:extLst>
+              <a:ext uri="{FF2B5EF4-FFF2-40B4-BE49-F238E27FC236}">
+                <a16:creationId xmlns:a16="http://schemas.microsoft.com/office/drawing/2014/main" id="{A9495663-3F41-4863-A682-18F5EF0B32BE}"/>
+              </a:ext>
+            </a:extLst>
+          </p:cNvPr>
+          <p:cNvSpPr/>
+          <p:nvPr/>
+        </p:nvSpPr>
+        <p:spPr>
+          <a:xfrm>
+            <a:off x="5548003" y="381697"/>
+            <a:ext cx="1368779" cy="602890"/>
+          </a:xfrm>
+          <a:prstGeom prst="rect">
+            <a:avLst/>
+          </a:prstGeom>
+        </p:spPr>
+        <p:style>
+          <a:lnRef idx="2">
+            <a:schemeClr val="accent1">
+              <a:shade val="50000"/>
+            </a:schemeClr>
+          </a:lnRef>
+          <a:fillRef idx="1">
+            <a:schemeClr val="accent1"/>
+          </a:fillRef>
+          <a:effectRef idx="0">
+            <a:schemeClr val="accent1"/>
+          </a:effectRef>
+          <a:fontRef idx="minor">
+            <a:schemeClr val="lt1"/>
+          </a:fontRef>
+        </p:style>
+        <p:txBody>
+          <a:bodyPr rtlCol="0" anchor="ctr"/>
+          <a:lstStyle/>
+          <a:p>
+            <a:pPr algn="ctr"/>
+            <a:r>
+              <a:rPr lang="en-US" altLang="ko-KR" sz="900" dirty="0"/>
+              <a:t>GPS w/t Antenna</a:t>
+            </a:r>
+            <a:endParaRPr lang="ko-KR" altLang="en-US" sz="900" dirty="0"/>
+          </a:p>
+        </p:txBody>
+      </p:sp>
+      <p:sp>
+        <p:nvSpPr>
+          <p:cNvPr id="22" name="직사각형 21">
+            <a:extLst>
+              <a:ext uri="{FF2B5EF4-FFF2-40B4-BE49-F238E27FC236}">
+                <a16:creationId xmlns:a16="http://schemas.microsoft.com/office/drawing/2014/main" id="{33BC046E-9387-4C56-92B1-486235ED65A0}"/>
+              </a:ext>
+            </a:extLst>
+          </p:cNvPr>
+          <p:cNvSpPr/>
+          <p:nvPr/>
+        </p:nvSpPr>
+        <p:spPr>
+          <a:xfrm>
+            <a:off x="9461409" y="3175860"/>
+            <a:ext cx="1368779" cy="602890"/>
+          </a:xfrm>
+          <a:prstGeom prst="rect">
+            <a:avLst/>
+          </a:prstGeom>
+        </p:spPr>
+        <p:style>
+          <a:lnRef idx="2">
+            <a:schemeClr val="accent1">
+              <a:shade val="50000"/>
+            </a:schemeClr>
+          </a:lnRef>
+          <a:fillRef idx="1">
+            <a:schemeClr val="accent1"/>
+          </a:fillRef>
+          <a:effectRef idx="0">
+            <a:schemeClr val="accent1"/>
+          </a:effectRef>
+          <a:fontRef idx="minor">
+            <a:schemeClr val="lt1"/>
+          </a:fontRef>
+        </p:style>
+        <p:txBody>
+          <a:bodyPr rtlCol="0" anchor="ctr"/>
+          <a:lstStyle/>
+          <a:p>
+            <a:pPr algn="ctr"/>
+            <a:r>
+              <a:rPr lang="en-US" altLang="ko-KR" sz="900" dirty="0"/>
+              <a:t>HDMI</a:t>
+            </a:r>
+          </a:p>
+        </p:txBody>
+      </p:sp>
+      <p:sp>
+        <p:nvSpPr>
+          <p:cNvPr id="24" name="타원 23">
+            <a:extLst>
+              <a:ext uri="{FF2B5EF4-FFF2-40B4-BE49-F238E27FC236}">
+                <a16:creationId xmlns:a16="http://schemas.microsoft.com/office/drawing/2014/main" id="{17633CF6-BC07-41C4-A844-7A48BF1EBF92}"/>
+              </a:ext>
+            </a:extLst>
+          </p:cNvPr>
+          <p:cNvSpPr/>
+          <p:nvPr/>
+        </p:nvSpPr>
+        <p:spPr>
+          <a:xfrm>
+            <a:off x="4876560" y="6373412"/>
+            <a:ext cx="469784" cy="414076"/>
+          </a:xfrm>
+          <a:prstGeom prst="ellipse">
+            <a:avLst/>
+          </a:prstGeom>
+        </p:spPr>
+        <p:style>
+          <a:lnRef idx="2">
+            <a:schemeClr val="accent1">
+              <a:shade val="50000"/>
+            </a:schemeClr>
+          </a:lnRef>
+          <a:fillRef idx="1">
+            <a:schemeClr val="accent1"/>
+          </a:fillRef>
+          <a:effectRef idx="0">
+            <a:schemeClr val="accent1"/>
+          </a:effectRef>
+          <a:fontRef idx="minor">
+            <a:schemeClr val="lt1"/>
+          </a:fontRef>
+        </p:style>
+        <p:txBody>
+          <a:bodyPr rtlCol="0" anchor="ctr"/>
+          <a:lstStyle/>
+          <a:p>
+            <a:pPr algn="ctr"/>
+            <a:r>
+              <a:rPr lang="en-US" altLang="ko-KR" sz="900" dirty="0"/>
+              <a:t>P</a:t>
+            </a:r>
+            <a:endParaRPr lang="ko-KR" altLang="en-US" sz="900" dirty="0"/>
+          </a:p>
+        </p:txBody>
+      </p:sp>
+      <p:sp>
+        <p:nvSpPr>
+          <p:cNvPr id="25" name="타원 24">
+            <a:extLst>
+              <a:ext uri="{FF2B5EF4-FFF2-40B4-BE49-F238E27FC236}">
+                <a16:creationId xmlns:a16="http://schemas.microsoft.com/office/drawing/2014/main" id="{C4255A68-0A20-4209-8812-6A95A0A2EDB8}"/>
+              </a:ext>
+            </a:extLst>
+          </p:cNvPr>
+          <p:cNvSpPr/>
+          <p:nvPr/>
+        </p:nvSpPr>
+        <p:spPr>
+          <a:xfrm>
+            <a:off x="3879202" y="6393211"/>
+            <a:ext cx="469784" cy="414076"/>
+          </a:xfrm>
+          <a:prstGeom prst="ellipse">
+            <a:avLst/>
+          </a:prstGeom>
+        </p:spPr>
+        <p:style>
+          <a:lnRef idx="2">
+            <a:schemeClr val="accent1">
+              <a:shade val="50000"/>
+            </a:schemeClr>
+          </a:lnRef>
+          <a:fillRef idx="1">
+            <a:schemeClr val="accent1"/>
+          </a:fillRef>
+          <a:effectRef idx="0">
+            <a:schemeClr val="accent1"/>
+          </a:effectRef>
+          <a:fontRef idx="minor">
+            <a:schemeClr val="lt1"/>
+          </a:fontRef>
+        </p:style>
+        <p:txBody>
+          <a:bodyPr rtlCol="0" anchor="ctr"/>
+          <a:lstStyle/>
+          <a:p>
+            <a:pPr algn="ctr"/>
+            <a:r>
+              <a:rPr lang="en-US" altLang="ko-KR" sz="900" dirty="0"/>
+              <a:t>C</a:t>
+            </a:r>
+            <a:endParaRPr lang="ko-KR" altLang="en-US" sz="900" dirty="0"/>
+          </a:p>
+        </p:txBody>
+      </p:sp>
+    </p:spTree>
+    <p:extLst>
+      <p:ext uri="{BB962C8B-B14F-4D97-AF65-F5344CB8AC3E}">
+        <p14:creationId xmlns:p14="http://schemas.microsoft.com/office/powerpoint/2010/main" val="1945196961"/>
+      </p:ext>
+    </p:extLst>
+  </p:cSld>
+  <p:clrMapOvr>
+    <a:masterClrMapping/>
+  </p:clrMapOvr>
+</p:sld>
+</file>
+
 <file path=ppt/theme/theme1.xml><?xml version="1.0" encoding="utf-8"?>
 <a:theme xmlns:a="http://schemas.openxmlformats.org/drawingml/2006/main" name="Office 테마">
   <a:themeElements>

</xml_diff>